<commit_message>
Updating the administration module page diagrams
git-svn-id: http://gforge.hl7.org/svn/fhir/trunk/build@9936 2f0db536-2c49-4257-a3fa-e771ed206c19
</commit_message>
<xml_diff>
--- a/images/source/administration-module-resources.pptx
+++ b/images/source/administration-module-resources.pptx
@@ -7,8 +7,8 @@
   <p:sldIdLst>
     <p:sldId id="261" r:id="rId2"/>
     <p:sldId id="260" r:id="rId3"/>
-    <p:sldId id="257" r:id="rId4"/>
-    <p:sldId id="268" r:id="rId5"/>
+    <p:sldId id="268" r:id="rId4"/>
+    <p:sldId id="257" r:id="rId5"/>
     <p:sldId id="258" r:id="rId6"/>
     <p:sldId id="259" r:id="rId7"/>
     <p:sldId id="263" r:id="rId8"/>
@@ -251,7 +251,7 @@
           <a:p>
             <a:fld id="{DE4E7392-00FF-4A5B-A4FB-CA939482D6BD}" type="datetimeFigureOut">
               <a:rPr lang="en-US" smtClean="0"/>
-              <a:t>10/4/2016</a:t>
+              <a:t>10/5/2016</a:t>
             </a:fld>
             <a:endParaRPr lang="en-US"/>
           </a:p>
@@ -419,7 +419,7 @@
           <a:p>
             <a:fld id="{DE4E7392-00FF-4A5B-A4FB-CA939482D6BD}" type="datetimeFigureOut">
               <a:rPr lang="en-US" smtClean="0"/>
-              <a:t>10/4/2016</a:t>
+              <a:t>10/5/2016</a:t>
             </a:fld>
             <a:endParaRPr lang="en-US"/>
           </a:p>
@@ -597,7 +597,7 @@
           <a:p>
             <a:fld id="{DE4E7392-00FF-4A5B-A4FB-CA939482D6BD}" type="datetimeFigureOut">
               <a:rPr lang="en-US" smtClean="0"/>
-              <a:t>10/4/2016</a:t>
+              <a:t>10/5/2016</a:t>
             </a:fld>
             <a:endParaRPr lang="en-US"/>
           </a:p>
@@ -765,7 +765,7 @@
           <a:p>
             <a:fld id="{DE4E7392-00FF-4A5B-A4FB-CA939482D6BD}" type="datetimeFigureOut">
               <a:rPr lang="en-US" smtClean="0"/>
-              <a:t>10/4/2016</a:t>
+              <a:t>10/5/2016</a:t>
             </a:fld>
             <a:endParaRPr lang="en-US"/>
           </a:p>
@@ -1010,7 +1010,7 @@
           <a:p>
             <a:fld id="{DE4E7392-00FF-4A5B-A4FB-CA939482D6BD}" type="datetimeFigureOut">
               <a:rPr lang="en-US" smtClean="0"/>
-              <a:t>10/4/2016</a:t>
+              <a:t>10/5/2016</a:t>
             </a:fld>
             <a:endParaRPr lang="en-US"/>
           </a:p>
@@ -1239,7 +1239,7 @@
           <a:p>
             <a:fld id="{DE4E7392-00FF-4A5B-A4FB-CA939482D6BD}" type="datetimeFigureOut">
               <a:rPr lang="en-US" smtClean="0"/>
-              <a:t>10/4/2016</a:t>
+              <a:t>10/5/2016</a:t>
             </a:fld>
             <a:endParaRPr lang="en-US"/>
           </a:p>
@@ -1603,7 +1603,7 @@
           <a:p>
             <a:fld id="{DE4E7392-00FF-4A5B-A4FB-CA939482D6BD}" type="datetimeFigureOut">
               <a:rPr lang="en-US" smtClean="0"/>
-              <a:t>10/4/2016</a:t>
+              <a:t>10/5/2016</a:t>
             </a:fld>
             <a:endParaRPr lang="en-US"/>
           </a:p>
@@ -1720,7 +1720,7 @@
           <a:p>
             <a:fld id="{DE4E7392-00FF-4A5B-A4FB-CA939482D6BD}" type="datetimeFigureOut">
               <a:rPr lang="en-US" smtClean="0"/>
-              <a:t>10/4/2016</a:t>
+              <a:t>10/5/2016</a:t>
             </a:fld>
             <a:endParaRPr lang="en-US"/>
           </a:p>
@@ -1815,7 +1815,7 @@
           <a:p>
             <a:fld id="{DE4E7392-00FF-4A5B-A4FB-CA939482D6BD}" type="datetimeFigureOut">
               <a:rPr lang="en-US" smtClean="0"/>
-              <a:t>10/4/2016</a:t>
+              <a:t>10/5/2016</a:t>
             </a:fld>
             <a:endParaRPr lang="en-US"/>
           </a:p>
@@ -2090,7 +2090,7 @@
           <a:p>
             <a:fld id="{DE4E7392-00FF-4A5B-A4FB-CA939482D6BD}" type="datetimeFigureOut">
               <a:rPr lang="en-US" smtClean="0"/>
-              <a:t>10/4/2016</a:t>
+              <a:t>10/5/2016</a:t>
             </a:fld>
             <a:endParaRPr lang="en-US"/>
           </a:p>
@@ -2342,7 +2342,7 @@
           <a:p>
             <a:fld id="{DE4E7392-00FF-4A5B-A4FB-CA939482D6BD}" type="datetimeFigureOut">
               <a:rPr lang="en-US" smtClean="0"/>
-              <a:t>10/4/2016</a:t>
+              <a:t>10/5/2016</a:t>
             </a:fld>
             <a:endParaRPr lang="en-US"/>
           </a:p>
@@ -2553,7 +2553,7 @@
           <a:p>
             <a:fld id="{DE4E7392-00FF-4A5B-A4FB-CA939482D6BD}" type="datetimeFigureOut">
               <a:rPr lang="en-US" smtClean="0"/>
-              <a:t>10/4/2016</a:t>
+              <a:t>10/5/2016</a:t>
             </a:fld>
             <a:endParaRPr lang="en-US"/>
           </a:p>
@@ -6265,6 +6265,105 @@
       </p:grpSpPr>
       <p:cxnSp>
         <p:nvCxnSpPr>
+          <p:cNvPr id="68" name="Elbow Connector 37"/>
+          <p:cNvCxnSpPr/>
+          <p:nvPr/>
+        </p:nvCxnSpPr>
+        <p:spPr>
+          <a:xfrm flipH="1">
+            <a:off x="7392918" y="3988403"/>
+            <a:ext cx="181668" cy="438057"/>
+          </a:xfrm>
+          <a:prstGeom prst="straightConnector1">
+            <a:avLst/>
+          </a:prstGeom>
+          <a:ln>
+            <a:tailEnd type="triangle"/>
+          </a:ln>
+        </p:spPr>
+        <p:style>
+          <a:lnRef idx="3">
+            <a:schemeClr val="dk1"/>
+          </a:lnRef>
+          <a:fillRef idx="0">
+            <a:schemeClr val="dk1"/>
+          </a:fillRef>
+          <a:effectRef idx="2">
+            <a:schemeClr val="dk1"/>
+          </a:effectRef>
+          <a:fontRef idx="minor">
+            <a:schemeClr val="tx1"/>
+          </a:fontRef>
+        </p:style>
+      </p:cxnSp>
+      <p:cxnSp>
+        <p:nvCxnSpPr>
+          <p:cNvPr id="74" name="Elbow Connector 37"/>
+          <p:cNvCxnSpPr/>
+          <p:nvPr/>
+        </p:nvCxnSpPr>
+        <p:spPr>
+          <a:xfrm>
+            <a:off x="5093063" y="4974114"/>
+            <a:ext cx="1094509" cy="0"/>
+          </a:xfrm>
+          <a:prstGeom prst="straightConnector1">
+            <a:avLst/>
+          </a:prstGeom>
+          <a:ln>
+            <a:tailEnd type="triangle"/>
+          </a:ln>
+        </p:spPr>
+        <p:style>
+          <a:lnRef idx="3">
+            <a:schemeClr val="dk1"/>
+          </a:lnRef>
+          <a:fillRef idx="0">
+            <a:schemeClr val="dk1"/>
+          </a:fillRef>
+          <a:effectRef idx="2">
+            <a:schemeClr val="dk1"/>
+          </a:effectRef>
+          <a:fontRef idx="minor">
+            <a:schemeClr val="tx1"/>
+          </a:fontRef>
+        </p:style>
+      </p:cxnSp>
+      <p:cxnSp>
+        <p:nvCxnSpPr>
+          <p:cNvPr id="80" name="Elbow Connector 37"/>
+          <p:cNvCxnSpPr/>
+          <p:nvPr/>
+        </p:nvCxnSpPr>
+        <p:spPr>
+          <a:xfrm>
+            <a:off x="3504430" y="3767012"/>
+            <a:ext cx="2475316" cy="915780"/>
+          </a:xfrm>
+          <a:prstGeom prst="straightConnector1">
+            <a:avLst/>
+          </a:prstGeom>
+          <a:ln>
+            <a:tailEnd type="triangle"/>
+          </a:ln>
+        </p:spPr>
+        <p:style>
+          <a:lnRef idx="3">
+            <a:schemeClr val="dk1"/>
+          </a:lnRef>
+          <a:fillRef idx="0">
+            <a:schemeClr val="dk1"/>
+          </a:fillRef>
+          <a:effectRef idx="2">
+            <a:schemeClr val="dk1"/>
+          </a:effectRef>
+          <a:fontRef idx="minor">
+            <a:schemeClr val="tx1"/>
+          </a:fontRef>
+        </p:style>
+      </p:cxnSp>
+      <p:cxnSp>
+        <p:nvCxnSpPr>
           <p:cNvPr id="76" name="Elbow Connector 37"/>
           <p:cNvCxnSpPr/>
           <p:nvPr/>
@@ -6277,25 +6376,19 @@
           <a:prstGeom prst="straightConnector1">
             <a:avLst/>
           </a:prstGeom>
-          <a:ln w="19050" cap="flat" cmpd="sng" algn="ctr">
-            <a:solidFill>
-              <a:schemeClr val="accent1"/>
-            </a:solidFill>
-            <a:prstDash val="dash"/>
-            <a:round/>
-            <a:headEnd type="none" w="med" len="med"/>
-            <a:tailEnd type="triangle" w="med" len="med"/>
-          </a:ln>
-        </p:spPr>
-        <p:style>
-          <a:lnRef idx="0">
-            <a:scrgbClr r="0" g="0" b="0"/>
+          <a:ln>
+            <a:tailEnd type="triangle"/>
+          </a:ln>
+        </p:spPr>
+        <p:style>
+          <a:lnRef idx="3">
+            <a:schemeClr val="dk1"/>
           </a:lnRef>
           <a:fillRef idx="0">
-            <a:scrgbClr r="0" g="0" b="0"/>
-          </a:fillRef>
-          <a:effectRef idx="0">
-            <a:scrgbClr r="0" g="0" b="0"/>
+            <a:schemeClr val="dk1"/>
+          </a:fillRef>
+          <a:effectRef idx="2">
+            <a:schemeClr val="dk1"/>
           </a:effectRef>
           <a:fontRef idx="minor">
             <a:schemeClr val="tx1"/>
@@ -6746,6 +6839,568 @@
         <p:spPr>
           <a:xfrm>
             <a:off x="6309028" y="4609867"/>
+            <a:ext cx="1468649" cy="728495"/>
+          </a:xfrm>
+          <a:prstGeom prst="roundRect">
+            <a:avLst/>
+          </a:prstGeom>
+          <a:solidFill>
+            <a:srgbClr val="CEE1F2"/>
+          </a:solidFill>
+          <a:ln cap="rnd">
+            <a:round/>
+          </a:ln>
+          <a:effectLst>
+            <a:outerShdw blurRad="50800" dist="38100" dir="2700000" algn="tl" rotWithShape="0">
+              <a:prstClr val="black">
+                <a:alpha val="40000"/>
+              </a:prstClr>
+            </a:outerShdw>
+          </a:effectLst>
+        </p:spPr>
+        <p:style>
+          <a:lnRef idx="2">
+            <a:schemeClr val="accent1">
+              <a:shade val="50000"/>
+            </a:schemeClr>
+          </a:lnRef>
+          <a:fillRef idx="1">
+            <a:schemeClr val="accent1"/>
+          </a:fillRef>
+          <a:effectRef idx="0">
+            <a:schemeClr val="accent1"/>
+          </a:effectRef>
+          <a:fontRef idx="minor">
+            <a:schemeClr val="lt1"/>
+          </a:fontRef>
+        </p:style>
+        <p:txBody>
+          <a:bodyPr rtlCol="0" anchor="ctr"/>
+          <a:lstStyle/>
+          <a:p>
+            <a:pPr algn="ctr"/>
+            <a:r>
+              <a:rPr lang="en-US" dirty="0">
+                <a:solidFill>
+                  <a:schemeClr val="tx1"/>
+                </a:solidFill>
+              </a:rPr>
+              <a:t>Endpoint</a:t>
+            </a:r>
+            <a:endParaRPr lang="en-AU" dirty="0">
+              <a:solidFill>
+                <a:schemeClr val="tx1"/>
+              </a:solidFill>
+            </a:endParaRPr>
+          </a:p>
+        </p:txBody>
+      </p:sp>
+      <p:sp>
+        <p:nvSpPr>
+          <p:cNvPr id="22" name="Rounded Rectangle 23"/>
+          <p:cNvSpPr/>
+          <p:nvPr/>
+        </p:nvSpPr>
+        <p:spPr>
+          <a:xfrm>
+            <a:off x="7814362" y="5879813"/>
+            <a:ext cx="1468649" cy="728495"/>
+          </a:xfrm>
+          <a:prstGeom prst="roundRect">
+            <a:avLst/>
+          </a:prstGeom>
+          <a:solidFill>
+            <a:schemeClr val="accent3">
+              <a:alpha val="50000"/>
+            </a:schemeClr>
+          </a:solidFill>
+          <a:ln>
+            <a:noFill/>
+          </a:ln>
+        </p:spPr>
+        <p:style>
+          <a:lnRef idx="0">
+            <a:scrgbClr r="0" g="0" b="0"/>
+          </a:lnRef>
+          <a:fillRef idx="0">
+            <a:scrgbClr r="0" g="0" b="0"/>
+          </a:fillRef>
+          <a:effectRef idx="0">
+            <a:scrgbClr r="0" g="0" b="0"/>
+          </a:effectRef>
+          <a:fontRef idx="minor">
+            <a:schemeClr val="lt1"/>
+          </a:fontRef>
+        </p:style>
+        <p:txBody>
+          <a:bodyPr lIns="36000" rIns="36000" rtlCol="0" anchor="ctr"/>
+          <a:lstStyle/>
+          <a:p>
+            <a:pPr algn="ctr"/>
+            <a:r>
+              <a:rPr lang="en-US" sz="1600" dirty="0"/>
+              <a:t>Questionnaire</a:t>
+            </a:r>
+            <a:endParaRPr lang="en-AU" sz="1600" dirty="0"/>
+          </a:p>
+        </p:txBody>
+      </p:sp>
+      <p:sp>
+        <p:nvSpPr>
+          <p:cNvPr id="23" name="Rounded Rectangle 24"/>
+          <p:cNvSpPr/>
+          <p:nvPr/>
+        </p:nvSpPr>
+        <p:spPr>
+          <a:xfrm>
+            <a:off x="9503227" y="5879813"/>
+            <a:ext cx="1468649" cy="728495"/>
+          </a:xfrm>
+          <a:prstGeom prst="roundRect">
+            <a:avLst/>
+          </a:prstGeom>
+          <a:solidFill>
+            <a:schemeClr val="accent3">
+              <a:alpha val="50000"/>
+            </a:schemeClr>
+          </a:solidFill>
+          <a:ln>
+            <a:noFill/>
+          </a:ln>
+        </p:spPr>
+        <p:style>
+          <a:lnRef idx="0">
+            <a:scrgbClr r="0" g="0" b="0"/>
+          </a:lnRef>
+          <a:fillRef idx="0">
+            <a:scrgbClr r="0" g="0" b="0"/>
+          </a:fillRef>
+          <a:effectRef idx="0">
+            <a:scrgbClr r="0" g="0" b="0"/>
+          </a:effectRef>
+          <a:fontRef idx="minor">
+            <a:schemeClr val="lt1"/>
+          </a:fontRef>
+        </p:style>
+        <p:txBody>
+          <a:bodyPr rtlCol="0" anchor="ctr"/>
+          <a:lstStyle/>
+          <a:p>
+            <a:r>
+              <a:rPr lang="en-US" sz="1600" dirty="0"/>
+              <a:t>…</a:t>
+            </a:r>
+            <a:endParaRPr lang="en-AU" sz="1600" dirty="0"/>
+          </a:p>
+        </p:txBody>
+      </p:sp>
+      <p:sp>
+        <p:nvSpPr>
+          <p:cNvPr id="24" name="Rounded Rectangle 26"/>
+          <p:cNvSpPr/>
+          <p:nvPr/>
+        </p:nvSpPr>
+        <p:spPr>
+          <a:xfrm>
+            <a:off x="1058910" y="5879813"/>
+            <a:ext cx="1468649" cy="728495"/>
+          </a:xfrm>
+          <a:prstGeom prst="roundRect">
+            <a:avLst/>
+          </a:prstGeom>
+        </p:spPr>
+        <p:style>
+          <a:lnRef idx="0">
+            <a:schemeClr val="accent3"/>
+          </a:lnRef>
+          <a:fillRef idx="3">
+            <a:schemeClr val="accent3"/>
+          </a:fillRef>
+          <a:effectRef idx="3">
+            <a:schemeClr val="accent3"/>
+          </a:effectRef>
+          <a:fontRef idx="minor">
+            <a:schemeClr val="lt1"/>
+          </a:fontRef>
+        </p:style>
+        <p:txBody>
+          <a:bodyPr rtlCol="0" anchor="ctr"/>
+          <a:lstStyle/>
+          <a:p>
+            <a:pPr algn="ctr"/>
+            <a:r>
+              <a:rPr lang="en-US" sz="1600" dirty="0"/>
+              <a:t>Document Reference</a:t>
+            </a:r>
+            <a:endParaRPr lang="en-AU" sz="1600" dirty="0"/>
+          </a:p>
+        </p:txBody>
+      </p:sp>
+      <p:sp>
+        <p:nvSpPr>
+          <p:cNvPr id="4" name="Rounded Rectangle 5"/>
+          <p:cNvSpPr/>
+          <p:nvPr/>
+        </p:nvSpPr>
+        <p:spPr>
+          <a:xfrm>
+            <a:off x="3766162" y="1866667"/>
+            <a:ext cx="1468649" cy="728495"/>
+          </a:xfrm>
+          <a:prstGeom prst="roundRect">
+            <a:avLst/>
+          </a:prstGeom>
+          <a:solidFill>
+            <a:srgbClr val="CEE1F2"/>
+          </a:solidFill>
+          <a:ln cap="rnd">
+            <a:round/>
+          </a:ln>
+          <a:effectLst>
+            <a:outerShdw blurRad="50800" dist="38100" dir="2700000" algn="tl" rotWithShape="0">
+              <a:prstClr val="black">
+                <a:alpha val="40000"/>
+              </a:prstClr>
+            </a:outerShdw>
+          </a:effectLst>
+        </p:spPr>
+        <p:style>
+          <a:lnRef idx="2">
+            <a:schemeClr val="accent1">
+              <a:shade val="50000"/>
+            </a:schemeClr>
+          </a:lnRef>
+          <a:fillRef idx="1">
+            <a:schemeClr val="accent1"/>
+          </a:fillRef>
+          <a:effectRef idx="0">
+            <a:schemeClr val="accent1"/>
+          </a:effectRef>
+          <a:fontRef idx="minor">
+            <a:schemeClr val="lt1"/>
+          </a:fontRef>
+        </p:style>
+        <p:txBody>
+          <a:bodyPr rtlCol="0" anchor="ctr"/>
+          <a:lstStyle/>
+          <a:p>
+            <a:pPr algn="ctr"/>
+            <a:r>
+              <a:rPr lang="en-US" dirty="0">
+                <a:solidFill>
+                  <a:schemeClr val="tx1"/>
+                </a:solidFill>
+              </a:rPr>
+              <a:t>Organization</a:t>
+            </a:r>
+            <a:endParaRPr lang="en-AU" dirty="0">
+              <a:solidFill>
+                <a:schemeClr val="tx1"/>
+              </a:solidFill>
+            </a:endParaRPr>
+          </a:p>
+        </p:txBody>
+      </p:sp>
+      <p:sp>
+        <p:nvSpPr>
+          <p:cNvPr id="5" name="Rounded Rectangle 6"/>
+          <p:cNvSpPr/>
+          <p:nvPr/>
+        </p:nvSpPr>
+        <p:spPr>
+          <a:xfrm>
+            <a:off x="2071253" y="3233853"/>
+            <a:ext cx="1468649" cy="728495"/>
+          </a:xfrm>
+          <a:prstGeom prst="roundRect">
+            <a:avLst/>
+          </a:prstGeom>
+          <a:solidFill>
+            <a:srgbClr val="CEE1F2"/>
+          </a:solidFill>
+          <a:ln cap="rnd">
+            <a:round/>
+          </a:ln>
+          <a:effectLst>
+            <a:outerShdw blurRad="50800" dist="38100" dir="2700000" algn="tl" rotWithShape="0">
+              <a:prstClr val="black">
+                <a:alpha val="40000"/>
+              </a:prstClr>
+            </a:outerShdw>
+          </a:effectLst>
+        </p:spPr>
+        <p:style>
+          <a:lnRef idx="2">
+            <a:schemeClr val="accent1">
+              <a:shade val="50000"/>
+            </a:schemeClr>
+          </a:lnRef>
+          <a:fillRef idx="1">
+            <a:schemeClr val="accent1"/>
+          </a:fillRef>
+          <a:effectRef idx="0">
+            <a:schemeClr val="accent1"/>
+          </a:effectRef>
+          <a:fontRef idx="minor">
+            <a:schemeClr val="lt1"/>
+          </a:fontRef>
+        </p:style>
+        <p:txBody>
+          <a:bodyPr rtlCol="0" anchor="ctr"/>
+          <a:lstStyle/>
+          <a:p>
+            <a:pPr algn="ctr"/>
+            <a:r>
+              <a:rPr lang="en-US" dirty="0">
+                <a:solidFill>
+                  <a:schemeClr val="tx1"/>
+                </a:solidFill>
+              </a:rPr>
+              <a:t>Location</a:t>
+            </a:r>
+            <a:endParaRPr lang="en-AU" dirty="0">
+              <a:solidFill>
+                <a:schemeClr val="tx1"/>
+              </a:solidFill>
+            </a:endParaRPr>
+          </a:p>
+        </p:txBody>
+      </p:sp>
+      <p:sp>
+        <p:nvSpPr>
+          <p:cNvPr id="6" name="Rounded Rectangle 7"/>
+          <p:cNvSpPr/>
+          <p:nvPr/>
+        </p:nvSpPr>
+        <p:spPr>
+          <a:xfrm>
+            <a:off x="6785901" y="3233853"/>
+            <a:ext cx="1468649" cy="728495"/>
+          </a:xfrm>
+          <a:prstGeom prst="roundRect">
+            <a:avLst/>
+          </a:prstGeom>
+          <a:solidFill>
+            <a:srgbClr val="CEE1F2"/>
+          </a:solidFill>
+          <a:ln cap="rnd">
+            <a:round/>
+          </a:ln>
+          <a:effectLst>
+            <a:outerShdw blurRad="50800" dist="38100" dir="2700000" algn="tl" rotWithShape="0">
+              <a:prstClr val="black">
+                <a:alpha val="40000"/>
+              </a:prstClr>
+            </a:outerShdw>
+          </a:effectLst>
+        </p:spPr>
+        <p:style>
+          <a:lnRef idx="2">
+            <a:schemeClr val="accent1">
+              <a:shade val="50000"/>
+            </a:schemeClr>
+          </a:lnRef>
+          <a:fillRef idx="1">
+            <a:schemeClr val="accent1"/>
+          </a:fillRef>
+          <a:effectRef idx="0">
+            <a:schemeClr val="accent1"/>
+          </a:effectRef>
+          <a:fontRef idx="minor">
+            <a:schemeClr val="lt1"/>
+          </a:fontRef>
+        </p:style>
+        <p:txBody>
+          <a:bodyPr rtlCol="0" anchor="ctr"/>
+          <a:lstStyle/>
+          <a:p>
+            <a:pPr algn="ctr"/>
+            <a:r>
+              <a:rPr lang="en-US" dirty="0">
+                <a:solidFill>
+                  <a:schemeClr val="tx1"/>
+                </a:solidFill>
+              </a:rPr>
+              <a:t>Practitioner</a:t>
+            </a:r>
+          </a:p>
+          <a:p>
+            <a:pPr algn="ctr"/>
+            <a:endParaRPr lang="en-AU" dirty="0">
+              <a:solidFill>
+                <a:schemeClr val="tx1"/>
+              </a:solidFill>
+            </a:endParaRPr>
+          </a:p>
+        </p:txBody>
+      </p:sp>
+      <p:sp>
+        <p:nvSpPr>
+          <p:cNvPr id="7" name="Rounded Rectangle 8"/>
+          <p:cNvSpPr/>
+          <p:nvPr/>
+        </p:nvSpPr>
+        <p:spPr>
+          <a:xfrm>
+            <a:off x="3766162" y="4609867"/>
+            <a:ext cx="1468649" cy="728495"/>
+          </a:xfrm>
+          <a:prstGeom prst="roundRect">
+            <a:avLst/>
+          </a:prstGeom>
+          <a:solidFill>
+            <a:srgbClr val="CEE1F2"/>
+          </a:solidFill>
+          <a:ln cap="rnd">
+            <a:round/>
+          </a:ln>
+          <a:effectLst>
+            <a:outerShdw blurRad="50800" dist="38100" dir="2700000" algn="tl" rotWithShape="0">
+              <a:prstClr val="black">
+                <a:alpha val="40000"/>
+              </a:prstClr>
+            </a:outerShdw>
+          </a:effectLst>
+        </p:spPr>
+        <p:style>
+          <a:lnRef idx="2">
+            <a:schemeClr val="accent1">
+              <a:shade val="50000"/>
+            </a:schemeClr>
+          </a:lnRef>
+          <a:fillRef idx="1">
+            <a:schemeClr val="accent1"/>
+          </a:fillRef>
+          <a:effectRef idx="0">
+            <a:schemeClr val="accent1"/>
+          </a:effectRef>
+          <a:fontRef idx="minor">
+            <a:schemeClr val="lt1"/>
+          </a:fontRef>
+        </p:style>
+        <p:txBody>
+          <a:bodyPr rtlCol="0" anchor="ctr"/>
+          <a:lstStyle/>
+          <a:p>
+            <a:pPr algn="ctr"/>
+            <a:r>
+              <a:rPr lang="en-US" dirty="0">
+                <a:solidFill>
+                  <a:schemeClr val="tx1"/>
+                </a:solidFill>
+              </a:rPr>
+              <a:t>Healthcare Service</a:t>
+            </a:r>
+            <a:endParaRPr lang="en-AU" dirty="0">
+              <a:solidFill>
+                <a:schemeClr val="tx1"/>
+              </a:solidFill>
+            </a:endParaRPr>
+          </a:p>
+        </p:txBody>
+      </p:sp>
+      <p:sp>
+        <p:nvSpPr>
+          <p:cNvPr id="34" name="Rounded Rectangle 36"/>
+          <p:cNvSpPr/>
+          <p:nvPr/>
+        </p:nvSpPr>
+        <p:spPr>
+          <a:xfrm>
+            <a:off x="7253084" y="3682138"/>
+            <a:ext cx="909353" cy="405321"/>
+          </a:xfrm>
+          <a:prstGeom prst="roundRect">
+            <a:avLst/>
+          </a:prstGeom>
+          <a:solidFill>
+            <a:srgbClr val="71A7D9"/>
+          </a:solidFill>
+          <a:ln cap="rnd">
+            <a:round/>
+          </a:ln>
+          <a:effectLst>
+            <a:outerShdw blurRad="50800" dist="38100" dir="2700000" algn="tl" rotWithShape="0">
+              <a:prstClr val="black">
+                <a:alpha val="40000"/>
+              </a:prstClr>
+            </a:outerShdw>
+          </a:effectLst>
+        </p:spPr>
+        <p:style>
+          <a:lnRef idx="2">
+            <a:schemeClr val="accent1">
+              <a:shade val="50000"/>
+            </a:schemeClr>
+          </a:lnRef>
+          <a:fillRef idx="1">
+            <a:schemeClr val="accent1"/>
+          </a:fillRef>
+          <a:effectRef idx="0">
+            <a:schemeClr val="accent1"/>
+          </a:effectRef>
+          <a:fontRef idx="minor">
+            <a:schemeClr val="lt1"/>
+          </a:fontRef>
+        </p:style>
+        <p:txBody>
+          <a:bodyPr rtlCol="0" anchor="ctr"/>
+          <a:lstStyle/>
+          <a:p>
+            <a:pPr algn="ctr"/>
+            <a:r>
+              <a:rPr lang="en-US" dirty="0">
+                <a:solidFill>
+                  <a:schemeClr val="tx1"/>
+                </a:solidFill>
+              </a:rPr>
+              <a:t>Role</a:t>
+            </a:r>
+          </a:p>
+        </p:txBody>
+      </p:sp>
+      <p:cxnSp>
+        <p:nvCxnSpPr>
+          <p:cNvPr id="71" name="Elbow Connector 37"/>
+          <p:cNvCxnSpPr/>
+          <p:nvPr/>
+        </p:nvCxnSpPr>
+        <p:spPr>
+          <a:xfrm>
+            <a:off x="5771920" y="3884798"/>
+            <a:ext cx="415652" cy="463854"/>
+          </a:xfrm>
+          <a:prstGeom prst="straightConnector1">
+            <a:avLst/>
+          </a:prstGeom>
+          <a:ln>
+            <a:tailEnd type="triangle"/>
+          </a:ln>
+        </p:spPr>
+        <p:style>
+          <a:lnRef idx="3">
+            <a:schemeClr val="dk1"/>
+          </a:lnRef>
+          <a:fillRef idx="0">
+            <a:schemeClr val="dk1"/>
+          </a:fillRef>
+          <a:effectRef idx="2">
+            <a:schemeClr val="dk1"/>
+          </a:effectRef>
+          <a:fontRef idx="minor">
+            <a:schemeClr val="tx1"/>
+          </a:fontRef>
+        </p:style>
+      </p:cxnSp>
+      <p:sp>
+        <p:nvSpPr>
+          <p:cNvPr id="8" name="Rounded Rectangle 9"/>
+          <p:cNvSpPr/>
+          <p:nvPr/>
+        </p:nvSpPr>
+        <p:spPr>
+          <a:xfrm>
+            <a:off x="4449999" y="3233853"/>
             <a:ext cx="1468649" cy="728495"/>
           </a:xfrm>
           <a:prstGeom prst="roundRect">
@@ -6782,677 +7437,6 @@
             <a:pPr algn="ctr"/>
             <a:r>
               <a:rPr lang="en-US" sz="1600" dirty="0"/>
-              <a:t>Endpoint</a:t>
-            </a:r>
-            <a:endParaRPr lang="en-AU" sz="1600" dirty="0"/>
-          </a:p>
-        </p:txBody>
-      </p:sp>
-      <p:sp>
-        <p:nvSpPr>
-          <p:cNvPr id="22" name="Rounded Rectangle 23"/>
-          <p:cNvSpPr/>
-          <p:nvPr/>
-        </p:nvSpPr>
-        <p:spPr>
-          <a:xfrm>
-            <a:off x="7814362" y="5879813"/>
-            <a:ext cx="1468649" cy="728495"/>
-          </a:xfrm>
-          <a:prstGeom prst="roundRect">
-            <a:avLst/>
-          </a:prstGeom>
-          <a:solidFill>
-            <a:schemeClr val="accent3">
-              <a:alpha val="50000"/>
-            </a:schemeClr>
-          </a:solidFill>
-          <a:ln>
-            <a:noFill/>
-          </a:ln>
-        </p:spPr>
-        <p:style>
-          <a:lnRef idx="0">
-            <a:scrgbClr r="0" g="0" b="0"/>
-          </a:lnRef>
-          <a:fillRef idx="0">
-            <a:scrgbClr r="0" g="0" b="0"/>
-          </a:fillRef>
-          <a:effectRef idx="0">
-            <a:scrgbClr r="0" g="0" b="0"/>
-          </a:effectRef>
-          <a:fontRef idx="minor">
-            <a:schemeClr val="lt1"/>
-          </a:fontRef>
-        </p:style>
-        <p:txBody>
-          <a:bodyPr lIns="36000" rIns="36000" rtlCol="0" anchor="ctr"/>
-          <a:lstStyle/>
-          <a:p>
-            <a:pPr algn="ctr"/>
-            <a:r>
-              <a:rPr lang="en-US" sz="1600" dirty="0"/>
-              <a:t>Questionnaire</a:t>
-            </a:r>
-            <a:endParaRPr lang="en-AU" sz="1600" dirty="0"/>
-          </a:p>
-        </p:txBody>
-      </p:sp>
-      <p:sp>
-        <p:nvSpPr>
-          <p:cNvPr id="23" name="Rounded Rectangle 24"/>
-          <p:cNvSpPr/>
-          <p:nvPr/>
-        </p:nvSpPr>
-        <p:spPr>
-          <a:xfrm>
-            <a:off x="9503227" y="5879813"/>
-            <a:ext cx="1468649" cy="728495"/>
-          </a:xfrm>
-          <a:prstGeom prst="roundRect">
-            <a:avLst/>
-          </a:prstGeom>
-          <a:solidFill>
-            <a:schemeClr val="accent3">
-              <a:alpha val="50000"/>
-            </a:schemeClr>
-          </a:solidFill>
-          <a:ln>
-            <a:noFill/>
-          </a:ln>
-        </p:spPr>
-        <p:style>
-          <a:lnRef idx="0">
-            <a:scrgbClr r="0" g="0" b="0"/>
-          </a:lnRef>
-          <a:fillRef idx="0">
-            <a:scrgbClr r="0" g="0" b="0"/>
-          </a:fillRef>
-          <a:effectRef idx="0">
-            <a:scrgbClr r="0" g="0" b="0"/>
-          </a:effectRef>
-          <a:fontRef idx="minor">
-            <a:schemeClr val="lt1"/>
-          </a:fontRef>
-        </p:style>
-        <p:txBody>
-          <a:bodyPr rtlCol="0" anchor="ctr"/>
-          <a:lstStyle/>
-          <a:p>
-            <a:r>
-              <a:rPr lang="en-US" sz="1600" dirty="0"/>
-              <a:t>…</a:t>
-            </a:r>
-            <a:endParaRPr lang="en-AU" sz="1600" dirty="0"/>
-          </a:p>
-        </p:txBody>
-      </p:sp>
-      <p:sp>
-        <p:nvSpPr>
-          <p:cNvPr id="24" name="Rounded Rectangle 26"/>
-          <p:cNvSpPr/>
-          <p:nvPr/>
-        </p:nvSpPr>
-        <p:spPr>
-          <a:xfrm>
-            <a:off x="1058910" y="5879813"/>
-            <a:ext cx="1468649" cy="728495"/>
-          </a:xfrm>
-          <a:prstGeom prst="roundRect">
-            <a:avLst/>
-          </a:prstGeom>
-        </p:spPr>
-        <p:style>
-          <a:lnRef idx="0">
-            <a:schemeClr val="accent3"/>
-          </a:lnRef>
-          <a:fillRef idx="3">
-            <a:schemeClr val="accent3"/>
-          </a:fillRef>
-          <a:effectRef idx="3">
-            <a:schemeClr val="accent3"/>
-          </a:effectRef>
-          <a:fontRef idx="minor">
-            <a:schemeClr val="lt1"/>
-          </a:fontRef>
-        </p:style>
-        <p:txBody>
-          <a:bodyPr rtlCol="0" anchor="ctr"/>
-          <a:lstStyle/>
-          <a:p>
-            <a:pPr algn="ctr"/>
-            <a:r>
-              <a:rPr lang="en-US" sz="1600" dirty="0"/>
-              <a:t>Document Reference</a:t>
-            </a:r>
-            <a:endParaRPr lang="en-AU" sz="1600" dirty="0"/>
-          </a:p>
-        </p:txBody>
-      </p:sp>
-      <p:sp>
-        <p:nvSpPr>
-          <p:cNvPr id="4" name="Rounded Rectangle 5"/>
-          <p:cNvSpPr/>
-          <p:nvPr/>
-        </p:nvSpPr>
-        <p:spPr>
-          <a:xfrm>
-            <a:off x="3766162" y="1866667"/>
-            <a:ext cx="1468649" cy="728495"/>
-          </a:xfrm>
-          <a:prstGeom prst="roundRect">
-            <a:avLst/>
-          </a:prstGeom>
-          <a:solidFill>
-            <a:srgbClr val="CEE1F2"/>
-          </a:solidFill>
-          <a:ln cap="rnd">
-            <a:round/>
-          </a:ln>
-          <a:effectLst>
-            <a:outerShdw blurRad="50800" dist="38100" dir="2700000" algn="tl" rotWithShape="0">
-              <a:prstClr val="black">
-                <a:alpha val="40000"/>
-              </a:prstClr>
-            </a:outerShdw>
-          </a:effectLst>
-        </p:spPr>
-        <p:style>
-          <a:lnRef idx="2">
-            <a:schemeClr val="accent1">
-              <a:shade val="50000"/>
-            </a:schemeClr>
-          </a:lnRef>
-          <a:fillRef idx="1">
-            <a:schemeClr val="accent1"/>
-          </a:fillRef>
-          <a:effectRef idx="0">
-            <a:schemeClr val="accent1"/>
-          </a:effectRef>
-          <a:fontRef idx="minor">
-            <a:schemeClr val="lt1"/>
-          </a:fontRef>
-        </p:style>
-        <p:txBody>
-          <a:bodyPr rtlCol="0" anchor="ctr"/>
-          <a:lstStyle/>
-          <a:p>
-            <a:pPr algn="ctr"/>
-            <a:r>
-              <a:rPr lang="en-US" dirty="0">
-                <a:solidFill>
-                  <a:schemeClr val="tx1"/>
-                </a:solidFill>
-              </a:rPr>
-              <a:t>Organization</a:t>
-            </a:r>
-            <a:endParaRPr lang="en-AU" dirty="0">
-              <a:solidFill>
-                <a:schemeClr val="tx1"/>
-              </a:solidFill>
-            </a:endParaRPr>
-          </a:p>
-        </p:txBody>
-      </p:sp>
-      <p:sp>
-        <p:nvSpPr>
-          <p:cNvPr id="5" name="Rounded Rectangle 6"/>
-          <p:cNvSpPr/>
-          <p:nvPr/>
-        </p:nvSpPr>
-        <p:spPr>
-          <a:xfrm>
-            <a:off x="2071253" y="3233853"/>
-            <a:ext cx="1468649" cy="728495"/>
-          </a:xfrm>
-          <a:prstGeom prst="roundRect">
-            <a:avLst/>
-          </a:prstGeom>
-          <a:solidFill>
-            <a:srgbClr val="CEE1F2"/>
-          </a:solidFill>
-          <a:ln cap="rnd">
-            <a:round/>
-          </a:ln>
-          <a:effectLst>
-            <a:outerShdw blurRad="50800" dist="38100" dir="2700000" algn="tl" rotWithShape="0">
-              <a:prstClr val="black">
-                <a:alpha val="40000"/>
-              </a:prstClr>
-            </a:outerShdw>
-          </a:effectLst>
-        </p:spPr>
-        <p:style>
-          <a:lnRef idx="2">
-            <a:schemeClr val="accent1">
-              <a:shade val="50000"/>
-            </a:schemeClr>
-          </a:lnRef>
-          <a:fillRef idx="1">
-            <a:schemeClr val="accent1"/>
-          </a:fillRef>
-          <a:effectRef idx="0">
-            <a:schemeClr val="accent1"/>
-          </a:effectRef>
-          <a:fontRef idx="minor">
-            <a:schemeClr val="lt1"/>
-          </a:fontRef>
-        </p:style>
-        <p:txBody>
-          <a:bodyPr rtlCol="0" anchor="ctr"/>
-          <a:lstStyle/>
-          <a:p>
-            <a:pPr algn="ctr"/>
-            <a:r>
-              <a:rPr lang="en-US" dirty="0">
-                <a:solidFill>
-                  <a:schemeClr val="tx1"/>
-                </a:solidFill>
-              </a:rPr>
-              <a:t>Location</a:t>
-            </a:r>
-            <a:endParaRPr lang="en-AU" dirty="0">
-              <a:solidFill>
-                <a:schemeClr val="tx1"/>
-              </a:solidFill>
-            </a:endParaRPr>
-          </a:p>
-        </p:txBody>
-      </p:sp>
-      <p:sp>
-        <p:nvSpPr>
-          <p:cNvPr id="6" name="Rounded Rectangle 7"/>
-          <p:cNvSpPr/>
-          <p:nvPr/>
-        </p:nvSpPr>
-        <p:spPr>
-          <a:xfrm>
-            <a:off x="6785901" y="3233853"/>
-            <a:ext cx="1468649" cy="728495"/>
-          </a:xfrm>
-          <a:prstGeom prst="roundRect">
-            <a:avLst/>
-          </a:prstGeom>
-          <a:solidFill>
-            <a:srgbClr val="CEE1F2"/>
-          </a:solidFill>
-          <a:ln cap="rnd">
-            <a:round/>
-          </a:ln>
-          <a:effectLst>
-            <a:outerShdw blurRad="50800" dist="38100" dir="2700000" algn="tl" rotWithShape="0">
-              <a:prstClr val="black">
-                <a:alpha val="40000"/>
-              </a:prstClr>
-            </a:outerShdw>
-          </a:effectLst>
-        </p:spPr>
-        <p:style>
-          <a:lnRef idx="2">
-            <a:schemeClr val="accent1">
-              <a:shade val="50000"/>
-            </a:schemeClr>
-          </a:lnRef>
-          <a:fillRef idx="1">
-            <a:schemeClr val="accent1"/>
-          </a:fillRef>
-          <a:effectRef idx="0">
-            <a:schemeClr val="accent1"/>
-          </a:effectRef>
-          <a:fontRef idx="minor">
-            <a:schemeClr val="lt1"/>
-          </a:fontRef>
-        </p:style>
-        <p:txBody>
-          <a:bodyPr rtlCol="0" anchor="ctr"/>
-          <a:lstStyle/>
-          <a:p>
-            <a:pPr algn="ctr"/>
-            <a:r>
-              <a:rPr lang="en-US" dirty="0">
-                <a:solidFill>
-                  <a:schemeClr val="tx1"/>
-                </a:solidFill>
-              </a:rPr>
-              <a:t>Practitioner</a:t>
-            </a:r>
-          </a:p>
-          <a:p>
-            <a:pPr algn="ctr"/>
-            <a:endParaRPr lang="en-AU" dirty="0">
-              <a:solidFill>
-                <a:schemeClr val="tx1"/>
-              </a:solidFill>
-            </a:endParaRPr>
-          </a:p>
-        </p:txBody>
-      </p:sp>
-      <p:sp>
-        <p:nvSpPr>
-          <p:cNvPr id="7" name="Rounded Rectangle 8"/>
-          <p:cNvSpPr/>
-          <p:nvPr/>
-        </p:nvSpPr>
-        <p:spPr>
-          <a:xfrm>
-            <a:off x="3766162" y="4609867"/>
-            <a:ext cx="1468649" cy="728495"/>
-          </a:xfrm>
-          <a:prstGeom prst="roundRect">
-            <a:avLst/>
-          </a:prstGeom>
-          <a:solidFill>
-            <a:srgbClr val="CEE1F2"/>
-          </a:solidFill>
-          <a:ln cap="rnd">
-            <a:round/>
-          </a:ln>
-          <a:effectLst>
-            <a:outerShdw blurRad="50800" dist="38100" dir="2700000" algn="tl" rotWithShape="0">
-              <a:prstClr val="black">
-                <a:alpha val="40000"/>
-              </a:prstClr>
-            </a:outerShdw>
-          </a:effectLst>
-        </p:spPr>
-        <p:style>
-          <a:lnRef idx="2">
-            <a:schemeClr val="accent1">
-              <a:shade val="50000"/>
-            </a:schemeClr>
-          </a:lnRef>
-          <a:fillRef idx="1">
-            <a:schemeClr val="accent1"/>
-          </a:fillRef>
-          <a:effectRef idx="0">
-            <a:schemeClr val="accent1"/>
-          </a:effectRef>
-          <a:fontRef idx="minor">
-            <a:schemeClr val="lt1"/>
-          </a:fontRef>
-        </p:style>
-        <p:txBody>
-          <a:bodyPr rtlCol="0" anchor="ctr"/>
-          <a:lstStyle/>
-          <a:p>
-            <a:pPr algn="ctr"/>
-            <a:r>
-              <a:rPr lang="en-US" dirty="0">
-                <a:solidFill>
-                  <a:schemeClr val="tx1"/>
-                </a:solidFill>
-              </a:rPr>
-              <a:t>Healthcare Service</a:t>
-            </a:r>
-            <a:endParaRPr lang="en-AU" dirty="0">
-              <a:solidFill>
-                <a:schemeClr val="tx1"/>
-              </a:solidFill>
-            </a:endParaRPr>
-          </a:p>
-        </p:txBody>
-      </p:sp>
-      <p:sp>
-        <p:nvSpPr>
-          <p:cNvPr id="34" name="Rounded Rectangle 36"/>
-          <p:cNvSpPr/>
-          <p:nvPr/>
-        </p:nvSpPr>
-        <p:spPr>
-          <a:xfrm>
-            <a:off x="7253084" y="3682138"/>
-            <a:ext cx="909353" cy="405321"/>
-          </a:xfrm>
-          <a:prstGeom prst="roundRect">
-            <a:avLst/>
-          </a:prstGeom>
-          <a:solidFill>
-            <a:srgbClr val="71A7D9"/>
-          </a:solidFill>
-          <a:ln cap="rnd">
-            <a:round/>
-          </a:ln>
-          <a:effectLst>
-            <a:outerShdw blurRad="50800" dist="38100" dir="2700000" algn="tl" rotWithShape="0">
-              <a:prstClr val="black">
-                <a:alpha val="40000"/>
-              </a:prstClr>
-            </a:outerShdw>
-          </a:effectLst>
-        </p:spPr>
-        <p:style>
-          <a:lnRef idx="2">
-            <a:schemeClr val="accent1">
-              <a:shade val="50000"/>
-            </a:schemeClr>
-          </a:lnRef>
-          <a:fillRef idx="1">
-            <a:schemeClr val="accent1"/>
-          </a:fillRef>
-          <a:effectRef idx="0">
-            <a:schemeClr val="accent1"/>
-          </a:effectRef>
-          <a:fontRef idx="minor">
-            <a:schemeClr val="lt1"/>
-          </a:fontRef>
-        </p:style>
-        <p:txBody>
-          <a:bodyPr rtlCol="0" anchor="ctr"/>
-          <a:lstStyle/>
-          <a:p>
-            <a:pPr algn="ctr"/>
-            <a:r>
-              <a:rPr lang="en-US" dirty="0">
-                <a:solidFill>
-                  <a:schemeClr val="tx1"/>
-                </a:solidFill>
-              </a:rPr>
-              <a:t>Role</a:t>
-            </a:r>
-          </a:p>
-        </p:txBody>
-      </p:sp>
-      <p:cxnSp>
-        <p:nvCxnSpPr>
-          <p:cNvPr id="68" name="Elbow Connector 37"/>
-          <p:cNvCxnSpPr/>
-          <p:nvPr/>
-        </p:nvCxnSpPr>
-        <p:spPr>
-          <a:xfrm flipH="1">
-            <a:off x="7392918" y="3988403"/>
-            <a:ext cx="181668" cy="438057"/>
-          </a:xfrm>
-          <a:prstGeom prst="straightConnector1">
-            <a:avLst/>
-          </a:prstGeom>
-          <a:ln w="19050" cap="flat" cmpd="sng" algn="ctr">
-            <a:solidFill>
-              <a:schemeClr val="accent1"/>
-            </a:solidFill>
-            <a:prstDash val="dash"/>
-            <a:round/>
-            <a:headEnd type="none" w="med" len="med"/>
-            <a:tailEnd type="triangle" w="med" len="med"/>
-          </a:ln>
-        </p:spPr>
-        <p:style>
-          <a:lnRef idx="0">
-            <a:scrgbClr r="0" g="0" b="0"/>
-          </a:lnRef>
-          <a:fillRef idx="0">
-            <a:scrgbClr r="0" g="0" b="0"/>
-          </a:fillRef>
-          <a:effectRef idx="0">
-            <a:scrgbClr r="0" g="0" b="0"/>
-          </a:effectRef>
-          <a:fontRef idx="minor">
-            <a:schemeClr val="tx1"/>
-          </a:fontRef>
-        </p:style>
-      </p:cxnSp>
-      <p:cxnSp>
-        <p:nvCxnSpPr>
-          <p:cNvPr id="71" name="Elbow Connector 37"/>
-          <p:cNvCxnSpPr/>
-          <p:nvPr/>
-        </p:nvCxnSpPr>
-        <p:spPr>
-          <a:xfrm>
-            <a:off x="5771920" y="3884798"/>
-            <a:ext cx="415652" cy="463854"/>
-          </a:xfrm>
-          <a:prstGeom prst="straightConnector1">
-            <a:avLst/>
-          </a:prstGeom>
-          <a:ln w="19050" cap="flat" cmpd="sng" algn="ctr">
-            <a:solidFill>
-              <a:schemeClr val="accent1"/>
-            </a:solidFill>
-            <a:prstDash val="dash"/>
-            <a:round/>
-            <a:headEnd type="none" w="med" len="med"/>
-            <a:tailEnd type="triangle" w="med" len="med"/>
-          </a:ln>
-        </p:spPr>
-        <p:style>
-          <a:lnRef idx="0">
-            <a:scrgbClr r="0" g="0" b="0"/>
-          </a:lnRef>
-          <a:fillRef idx="0">
-            <a:scrgbClr r="0" g="0" b="0"/>
-          </a:fillRef>
-          <a:effectRef idx="0">
-            <a:scrgbClr r="0" g="0" b="0"/>
-          </a:effectRef>
-          <a:fontRef idx="minor">
-            <a:schemeClr val="tx1"/>
-          </a:fontRef>
-        </p:style>
-      </p:cxnSp>
-      <p:cxnSp>
-        <p:nvCxnSpPr>
-          <p:cNvPr id="74" name="Elbow Connector 37"/>
-          <p:cNvCxnSpPr/>
-          <p:nvPr/>
-        </p:nvCxnSpPr>
-        <p:spPr>
-          <a:xfrm>
-            <a:off x="5093063" y="4974114"/>
-            <a:ext cx="1094509" cy="0"/>
-          </a:xfrm>
-          <a:prstGeom prst="straightConnector1">
-            <a:avLst/>
-          </a:prstGeom>
-          <a:ln w="19050" cap="flat" cmpd="sng" algn="ctr">
-            <a:solidFill>
-              <a:schemeClr val="accent1"/>
-            </a:solidFill>
-            <a:prstDash val="dash"/>
-            <a:round/>
-            <a:headEnd type="none" w="med" len="med"/>
-            <a:tailEnd type="triangle" w="med" len="med"/>
-          </a:ln>
-        </p:spPr>
-        <p:style>
-          <a:lnRef idx="0">
-            <a:scrgbClr r="0" g="0" b="0"/>
-          </a:lnRef>
-          <a:fillRef idx="0">
-            <a:scrgbClr r="0" g="0" b="0"/>
-          </a:fillRef>
-          <a:effectRef idx="0">
-            <a:scrgbClr r="0" g="0" b="0"/>
-          </a:effectRef>
-          <a:fontRef idx="minor">
-            <a:schemeClr val="tx1"/>
-          </a:fontRef>
-        </p:style>
-      </p:cxnSp>
-      <p:cxnSp>
-        <p:nvCxnSpPr>
-          <p:cNvPr id="80" name="Elbow Connector 37"/>
-          <p:cNvCxnSpPr/>
-          <p:nvPr/>
-        </p:nvCxnSpPr>
-        <p:spPr>
-          <a:xfrm>
-            <a:off x="3504430" y="3767012"/>
-            <a:ext cx="2475316" cy="915780"/>
-          </a:xfrm>
-          <a:prstGeom prst="straightConnector1">
-            <a:avLst/>
-          </a:prstGeom>
-          <a:ln w="19050" cap="flat" cmpd="sng" algn="ctr">
-            <a:solidFill>
-              <a:schemeClr val="accent1"/>
-            </a:solidFill>
-            <a:prstDash val="dash"/>
-            <a:round/>
-            <a:headEnd type="none" w="med" len="med"/>
-            <a:tailEnd type="triangle" w="med" len="med"/>
-          </a:ln>
-        </p:spPr>
-        <p:style>
-          <a:lnRef idx="0">
-            <a:scrgbClr r="0" g="0" b="0"/>
-          </a:lnRef>
-          <a:fillRef idx="0">
-            <a:scrgbClr r="0" g="0" b="0"/>
-          </a:fillRef>
-          <a:effectRef idx="0">
-            <a:scrgbClr r="0" g="0" b="0"/>
-          </a:effectRef>
-          <a:fontRef idx="minor">
-            <a:schemeClr val="tx1"/>
-          </a:fontRef>
-        </p:style>
-      </p:cxnSp>
-      <p:sp>
-        <p:nvSpPr>
-          <p:cNvPr id="8" name="Rounded Rectangle 9"/>
-          <p:cNvSpPr/>
-          <p:nvPr/>
-        </p:nvSpPr>
-        <p:spPr>
-          <a:xfrm>
-            <a:off x="4449999" y="3233853"/>
-            <a:ext cx="1468649" cy="728495"/>
-          </a:xfrm>
-          <a:prstGeom prst="roundRect">
-            <a:avLst/>
-          </a:prstGeom>
-          <a:solidFill>
-            <a:schemeClr val="accent5">
-              <a:lumMod val="60000"/>
-              <a:lumOff val="40000"/>
-            </a:schemeClr>
-          </a:solidFill>
-          <a:ln>
-            <a:noFill/>
-          </a:ln>
-        </p:spPr>
-        <p:style>
-          <a:lnRef idx="0">
-            <a:scrgbClr r="0" g="0" b="0"/>
-          </a:lnRef>
-          <a:fillRef idx="0">
-            <a:scrgbClr r="0" g="0" b="0"/>
-          </a:fillRef>
-          <a:effectRef idx="0">
-            <a:scrgbClr r="0" g="0" b="0"/>
-          </a:effectRef>
-          <a:fontRef idx="minor">
-            <a:schemeClr val="lt1"/>
-          </a:fontRef>
-        </p:style>
-        <p:txBody>
-          <a:bodyPr rtlCol="0" anchor="ctr"/>
-          <a:lstStyle/>
-          <a:p>
-            <a:pPr algn="ctr"/>
-            <a:r>
-              <a:rPr lang="en-US" sz="1600" dirty="0"/>
               <a:t>Practitioner Role</a:t>
             </a:r>
             <a:endParaRPr lang="en-AU" sz="1600" dirty="0"/>
@@ -7484,7 +7468,7 @@
     </p:spTree>
     <p:extLst>
       <p:ext uri="{BB962C8B-B14F-4D97-AF65-F5344CB8AC3E}">
-        <p14:creationId xmlns:p14="http://schemas.microsoft.com/office/powerpoint/2010/main" val="2995983434"/>
+        <p14:creationId xmlns:p14="http://schemas.microsoft.com/office/powerpoint/2010/main" val="3766799555"/>
       </p:ext>
     </p:extLst>
   </p:cSld>
@@ -7775,105 +7759,6 @@
       </p:grpSpPr>
       <p:cxnSp>
         <p:nvCxnSpPr>
-          <p:cNvPr id="68" name="Elbow Connector 37"/>
-          <p:cNvCxnSpPr/>
-          <p:nvPr/>
-        </p:nvCxnSpPr>
-        <p:spPr>
-          <a:xfrm flipH="1">
-            <a:off x="7392918" y="3988403"/>
-            <a:ext cx="181668" cy="438057"/>
-          </a:xfrm>
-          <a:prstGeom prst="straightConnector1">
-            <a:avLst/>
-          </a:prstGeom>
-          <a:ln>
-            <a:tailEnd type="triangle"/>
-          </a:ln>
-        </p:spPr>
-        <p:style>
-          <a:lnRef idx="3">
-            <a:schemeClr val="dk1"/>
-          </a:lnRef>
-          <a:fillRef idx="0">
-            <a:schemeClr val="dk1"/>
-          </a:fillRef>
-          <a:effectRef idx="2">
-            <a:schemeClr val="dk1"/>
-          </a:effectRef>
-          <a:fontRef idx="minor">
-            <a:schemeClr val="tx1"/>
-          </a:fontRef>
-        </p:style>
-      </p:cxnSp>
-      <p:cxnSp>
-        <p:nvCxnSpPr>
-          <p:cNvPr id="74" name="Elbow Connector 37"/>
-          <p:cNvCxnSpPr/>
-          <p:nvPr/>
-        </p:nvCxnSpPr>
-        <p:spPr>
-          <a:xfrm>
-            <a:off x="5093063" y="4974114"/>
-            <a:ext cx="1094509" cy="0"/>
-          </a:xfrm>
-          <a:prstGeom prst="straightConnector1">
-            <a:avLst/>
-          </a:prstGeom>
-          <a:ln>
-            <a:tailEnd type="triangle"/>
-          </a:ln>
-        </p:spPr>
-        <p:style>
-          <a:lnRef idx="3">
-            <a:schemeClr val="dk1"/>
-          </a:lnRef>
-          <a:fillRef idx="0">
-            <a:schemeClr val="dk1"/>
-          </a:fillRef>
-          <a:effectRef idx="2">
-            <a:schemeClr val="dk1"/>
-          </a:effectRef>
-          <a:fontRef idx="minor">
-            <a:schemeClr val="tx1"/>
-          </a:fontRef>
-        </p:style>
-      </p:cxnSp>
-      <p:cxnSp>
-        <p:nvCxnSpPr>
-          <p:cNvPr id="80" name="Elbow Connector 37"/>
-          <p:cNvCxnSpPr/>
-          <p:nvPr/>
-        </p:nvCxnSpPr>
-        <p:spPr>
-          <a:xfrm>
-            <a:off x="3504430" y="3767012"/>
-            <a:ext cx="2475316" cy="915780"/>
-          </a:xfrm>
-          <a:prstGeom prst="straightConnector1">
-            <a:avLst/>
-          </a:prstGeom>
-          <a:ln>
-            <a:tailEnd type="triangle"/>
-          </a:ln>
-        </p:spPr>
-        <p:style>
-          <a:lnRef idx="3">
-            <a:schemeClr val="dk1"/>
-          </a:lnRef>
-          <a:fillRef idx="0">
-            <a:schemeClr val="dk1"/>
-          </a:fillRef>
-          <a:effectRef idx="2">
-            <a:schemeClr val="dk1"/>
-          </a:effectRef>
-          <a:fontRef idx="minor">
-            <a:schemeClr val="tx1"/>
-          </a:fontRef>
-        </p:style>
-      </p:cxnSp>
-      <p:cxnSp>
-        <p:nvCxnSpPr>
           <p:cNvPr id="76" name="Elbow Connector 37"/>
           <p:cNvCxnSpPr/>
           <p:nvPr/>
@@ -7886,19 +7771,25 @@
           <a:prstGeom prst="straightConnector1">
             <a:avLst/>
           </a:prstGeom>
-          <a:ln>
-            <a:tailEnd type="triangle"/>
-          </a:ln>
-        </p:spPr>
-        <p:style>
-          <a:lnRef idx="3">
-            <a:schemeClr val="dk1"/>
+          <a:ln w="19050" cap="flat" cmpd="sng" algn="ctr">
+            <a:solidFill>
+              <a:schemeClr val="accent1"/>
+            </a:solidFill>
+            <a:prstDash val="dash"/>
+            <a:round/>
+            <a:headEnd type="none" w="med" len="med"/>
+            <a:tailEnd type="triangle" w="med" len="med"/>
+          </a:ln>
+        </p:spPr>
+        <p:style>
+          <a:lnRef idx="0">
+            <a:scrgbClr r="0" g="0" b="0"/>
           </a:lnRef>
           <a:fillRef idx="0">
-            <a:schemeClr val="dk1"/>
-          </a:fillRef>
-          <a:effectRef idx="2">
-            <a:schemeClr val="dk1"/>
+            <a:scrgbClr r="0" g="0" b="0"/>
+          </a:fillRef>
+          <a:effectRef idx="0">
+            <a:scrgbClr r="0" g="0" b="0"/>
           </a:effectRef>
           <a:fontRef idx="minor">
             <a:schemeClr val="tx1"/>
@@ -8349,568 +8240,6 @@
         <p:spPr>
           <a:xfrm>
             <a:off x="6309028" y="4609867"/>
-            <a:ext cx="1468649" cy="728495"/>
-          </a:xfrm>
-          <a:prstGeom prst="roundRect">
-            <a:avLst/>
-          </a:prstGeom>
-          <a:solidFill>
-            <a:srgbClr val="CEE1F2"/>
-          </a:solidFill>
-          <a:ln cap="rnd">
-            <a:round/>
-          </a:ln>
-          <a:effectLst>
-            <a:outerShdw blurRad="50800" dist="38100" dir="2700000" algn="tl" rotWithShape="0">
-              <a:prstClr val="black">
-                <a:alpha val="40000"/>
-              </a:prstClr>
-            </a:outerShdw>
-          </a:effectLst>
-        </p:spPr>
-        <p:style>
-          <a:lnRef idx="2">
-            <a:schemeClr val="accent1">
-              <a:shade val="50000"/>
-            </a:schemeClr>
-          </a:lnRef>
-          <a:fillRef idx="1">
-            <a:schemeClr val="accent1"/>
-          </a:fillRef>
-          <a:effectRef idx="0">
-            <a:schemeClr val="accent1"/>
-          </a:effectRef>
-          <a:fontRef idx="minor">
-            <a:schemeClr val="lt1"/>
-          </a:fontRef>
-        </p:style>
-        <p:txBody>
-          <a:bodyPr rtlCol="0" anchor="ctr"/>
-          <a:lstStyle/>
-          <a:p>
-            <a:pPr algn="ctr"/>
-            <a:r>
-              <a:rPr lang="en-US" dirty="0">
-                <a:solidFill>
-                  <a:schemeClr val="tx1"/>
-                </a:solidFill>
-              </a:rPr>
-              <a:t>Endpoint</a:t>
-            </a:r>
-            <a:endParaRPr lang="en-AU" dirty="0">
-              <a:solidFill>
-                <a:schemeClr val="tx1"/>
-              </a:solidFill>
-            </a:endParaRPr>
-          </a:p>
-        </p:txBody>
-      </p:sp>
-      <p:sp>
-        <p:nvSpPr>
-          <p:cNvPr id="22" name="Rounded Rectangle 23"/>
-          <p:cNvSpPr/>
-          <p:nvPr/>
-        </p:nvSpPr>
-        <p:spPr>
-          <a:xfrm>
-            <a:off x="7814362" y="5879813"/>
-            <a:ext cx="1468649" cy="728495"/>
-          </a:xfrm>
-          <a:prstGeom prst="roundRect">
-            <a:avLst/>
-          </a:prstGeom>
-          <a:solidFill>
-            <a:schemeClr val="accent3">
-              <a:alpha val="50000"/>
-            </a:schemeClr>
-          </a:solidFill>
-          <a:ln>
-            <a:noFill/>
-          </a:ln>
-        </p:spPr>
-        <p:style>
-          <a:lnRef idx="0">
-            <a:scrgbClr r="0" g="0" b="0"/>
-          </a:lnRef>
-          <a:fillRef idx="0">
-            <a:scrgbClr r="0" g="0" b="0"/>
-          </a:fillRef>
-          <a:effectRef idx="0">
-            <a:scrgbClr r="0" g="0" b="0"/>
-          </a:effectRef>
-          <a:fontRef idx="minor">
-            <a:schemeClr val="lt1"/>
-          </a:fontRef>
-        </p:style>
-        <p:txBody>
-          <a:bodyPr lIns="36000" rIns="36000" rtlCol="0" anchor="ctr"/>
-          <a:lstStyle/>
-          <a:p>
-            <a:pPr algn="ctr"/>
-            <a:r>
-              <a:rPr lang="en-US" sz="1600" dirty="0"/>
-              <a:t>Questionnaire</a:t>
-            </a:r>
-            <a:endParaRPr lang="en-AU" sz="1600" dirty="0"/>
-          </a:p>
-        </p:txBody>
-      </p:sp>
-      <p:sp>
-        <p:nvSpPr>
-          <p:cNvPr id="23" name="Rounded Rectangle 24"/>
-          <p:cNvSpPr/>
-          <p:nvPr/>
-        </p:nvSpPr>
-        <p:spPr>
-          <a:xfrm>
-            <a:off x="9503227" y="5879813"/>
-            <a:ext cx="1468649" cy="728495"/>
-          </a:xfrm>
-          <a:prstGeom prst="roundRect">
-            <a:avLst/>
-          </a:prstGeom>
-          <a:solidFill>
-            <a:schemeClr val="accent3">
-              <a:alpha val="50000"/>
-            </a:schemeClr>
-          </a:solidFill>
-          <a:ln>
-            <a:noFill/>
-          </a:ln>
-        </p:spPr>
-        <p:style>
-          <a:lnRef idx="0">
-            <a:scrgbClr r="0" g="0" b="0"/>
-          </a:lnRef>
-          <a:fillRef idx="0">
-            <a:scrgbClr r="0" g="0" b="0"/>
-          </a:fillRef>
-          <a:effectRef idx="0">
-            <a:scrgbClr r="0" g="0" b="0"/>
-          </a:effectRef>
-          <a:fontRef idx="minor">
-            <a:schemeClr val="lt1"/>
-          </a:fontRef>
-        </p:style>
-        <p:txBody>
-          <a:bodyPr rtlCol="0" anchor="ctr"/>
-          <a:lstStyle/>
-          <a:p>
-            <a:r>
-              <a:rPr lang="en-US" sz="1600" dirty="0"/>
-              <a:t>…</a:t>
-            </a:r>
-            <a:endParaRPr lang="en-AU" sz="1600" dirty="0"/>
-          </a:p>
-        </p:txBody>
-      </p:sp>
-      <p:sp>
-        <p:nvSpPr>
-          <p:cNvPr id="24" name="Rounded Rectangle 26"/>
-          <p:cNvSpPr/>
-          <p:nvPr/>
-        </p:nvSpPr>
-        <p:spPr>
-          <a:xfrm>
-            <a:off x="1058910" y="5879813"/>
-            <a:ext cx="1468649" cy="728495"/>
-          </a:xfrm>
-          <a:prstGeom prst="roundRect">
-            <a:avLst/>
-          </a:prstGeom>
-        </p:spPr>
-        <p:style>
-          <a:lnRef idx="0">
-            <a:schemeClr val="accent3"/>
-          </a:lnRef>
-          <a:fillRef idx="3">
-            <a:schemeClr val="accent3"/>
-          </a:fillRef>
-          <a:effectRef idx="3">
-            <a:schemeClr val="accent3"/>
-          </a:effectRef>
-          <a:fontRef idx="minor">
-            <a:schemeClr val="lt1"/>
-          </a:fontRef>
-        </p:style>
-        <p:txBody>
-          <a:bodyPr rtlCol="0" anchor="ctr"/>
-          <a:lstStyle/>
-          <a:p>
-            <a:pPr algn="ctr"/>
-            <a:r>
-              <a:rPr lang="en-US" sz="1600" dirty="0"/>
-              <a:t>Document Reference</a:t>
-            </a:r>
-            <a:endParaRPr lang="en-AU" sz="1600" dirty="0"/>
-          </a:p>
-        </p:txBody>
-      </p:sp>
-      <p:sp>
-        <p:nvSpPr>
-          <p:cNvPr id="4" name="Rounded Rectangle 5"/>
-          <p:cNvSpPr/>
-          <p:nvPr/>
-        </p:nvSpPr>
-        <p:spPr>
-          <a:xfrm>
-            <a:off x="3766162" y="1866667"/>
-            <a:ext cx="1468649" cy="728495"/>
-          </a:xfrm>
-          <a:prstGeom prst="roundRect">
-            <a:avLst/>
-          </a:prstGeom>
-          <a:solidFill>
-            <a:srgbClr val="CEE1F2"/>
-          </a:solidFill>
-          <a:ln cap="rnd">
-            <a:round/>
-          </a:ln>
-          <a:effectLst>
-            <a:outerShdw blurRad="50800" dist="38100" dir="2700000" algn="tl" rotWithShape="0">
-              <a:prstClr val="black">
-                <a:alpha val="40000"/>
-              </a:prstClr>
-            </a:outerShdw>
-          </a:effectLst>
-        </p:spPr>
-        <p:style>
-          <a:lnRef idx="2">
-            <a:schemeClr val="accent1">
-              <a:shade val="50000"/>
-            </a:schemeClr>
-          </a:lnRef>
-          <a:fillRef idx="1">
-            <a:schemeClr val="accent1"/>
-          </a:fillRef>
-          <a:effectRef idx="0">
-            <a:schemeClr val="accent1"/>
-          </a:effectRef>
-          <a:fontRef idx="minor">
-            <a:schemeClr val="lt1"/>
-          </a:fontRef>
-        </p:style>
-        <p:txBody>
-          <a:bodyPr rtlCol="0" anchor="ctr"/>
-          <a:lstStyle/>
-          <a:p>
-            <a:pPr algn="ctr"/>
-            <a:r>
-              <a:rPr lang="en-US" dirty="0">
-                <a:solidFill>
-                  <a:schemeClr val="tx1"/>
-                </a:solidFill>
-              </a:rPr>
-              <a:t>Organization</a:t>
-            </a:r>
-            <a:endParaRPr lang="en-AU" dirty="0">
-              <a:solidFill>
-                <a:schemeClr val="tx1"/>
-              </a:solidFill>
-            </a:endParaRPr>
-          </a:p>
-        </p:txBody>
-      </p:sp>
-      <p:sp>
-        <p:nvSpPr>
-          <p:cNvPr id="5" name="Rounded Rectangle 6"/>
-          <p:cNvSpPr/>
-          <p:nvPr/>
-        </p:nvSpPr>
-        <p:spPr>
-          <a:xfrm>
-            <a:off x="2071253" y="3233853"/>
-            <a:ext cx="1468649" cy="728495"/>
-          </a:xfrm>
-          <a:prstGeom prst="roundRect">
-            <a:avLst/>
-          </a:prstGeom>
-          <a:solidFill>
-            <a:srgbClr val="CEE1F2"/>
-          </a:solidFill>
-          <a:ln cap="rnd">
-            <a:round/>
-          </a:ln>
-          <a:effectLst>
-            <a:outerShdw blurRad="50800" dist="38100" dir="2700000" algn="tl" rotWithShape="0">
-              <a:prstClr val="black">
-                <a:alpha val="40000"/>
-              </a:prstClr>
-            </a:outerShdw>
-          </a:effectLst>
-        </p:spPr>
-        <p:style>
-          <a:lnRef idx="2">
-            <a:schemeClr val="accent1">
-              <a:shade val="50000"/>
-            </a:schemeClr>
-          </a:lnRef>
-          <a:fillRef idx="1">
-            <a:schemeClr val="accent1"/>
-          </a:fillRef>
-          <a:effectRef idx="0">
-            <a:schemeClr val="accent1"/>
-          </a:effectRef>
-          <a:fontRef idx="minor">
-            <a:schemeClr val="lt1"/>
-          </a:fontRef>
-        </p:style>
-        <p:txBody>
-          <a:bodyPr rtlCol="0" anchor="ctr"/>
-          <a:lstStyle/>
-          <a:p>
-            <a:pPr algn="ctr"/>
-            <a:r>
-              <a:rPr lang="en-US" dirty="0">
-                <a:solidFill>
-                  <a:schemeClr val="tx1"/>
-                </a:solidFill>
-              </a:rPr>
-              <a:t>Location</a:t>
-            </a:r>
-            <a:endParaRPr lang="en-AU" dirty="0">
-              <a:solidFill>
-                <a:schemeClr val="tx1"/>
-              </a:solidFill>
-            </a:endParaRPr>
-          </a:p>
-        </p:txBody>
-      </p:sp>
-      <p:sp>
-        <p:nvSpPr>
-          <p:cNvPr id="6" name="Rounded Rectangle 7"/>
-          <p:cNvSpPr/>
-          <p:nvPr/>
-        </p:nvSpPr>
-        <p:spPr>
-          <a:xfrm>
-            <a:off x="6785901" y="3233853"/>
-            <a:ext cx="1468649" cy="728495"/>
-          </a:xfrm>
-          <a:prstGeom prst="roundRect">
-            <a:avLst/>
-          </a:prstGeom>
-          <a:solidFill>
-            <a:srgbClr val="CEE1F2"/>
-          </a:solidFill>
-          <a:ln cap="rnd">
-            <a:round/>
-          </a:ln>
-          <a:effectLst>
-            <a:outerShdw blurRad="50800" dist="38100" dir="2700000" algn="tl" rotWithShape="0">
-              <a:prstClr val="black">
-                <a:alpha val="40000"/>
-              </a:prstClr>
-            </a:outerShdw>
-          </a:effectLst>
-        </p:spPr>
-        <p:style>
-          <a:lnRef idx="2">
-            <a:schemeClr val="accent1">
-              <a:shade val="50000"/>
-            </a:schemeClr>
-          </a:lnRef>
-          <a:fillRef idx="1">
-            <a:schemeClr val="accent1"/>
-          </a:fillRef>
-          <a:effectRef idx="0">
-            <a:schemeClr val="accent1"/>
-          </a:effectRef>
-          <a:fontRef idx="minor">
-            <a:schemeClr val="lt1"/>
-          </a:fontRef>
-        </p:style>
-        <p:txBody>
-          <a:bodyPr rtlCol="0" anchor="ctr"/>
-          <a:lstStyle/>
-          <a:p>
-            <a:pPr algn="ctr"/>
-            <a:r>
-              <a:rPr lang="en-US" dirty="0">
-                <a:solidFill>
-                  <a:schemeClr val="tx1"/>
-                </a:solidFill>
-              </a:rPr>
-              <a:t>Practitioner</a:t>
-            </a:r>
-          </a:p>
-          <a:p>
-            <a:pPr algn="ctr"/>
-            <a:endParaRPr lang="en-AU" dirty="0">
-              <a:solidFill>
-                <a:schemeClr val="tx1"/>
-              </a:solidFill>
-            </a:endParaRPr>
-          </a:p>
-        </p:txBody>
-      </p:sp>
-      <p:sp>
-        <p:nvSpPr>
-          <p:cNvPr id="7" name="Rounded Rectangle 8"/>
-          <p:cNvSpPr/>
-          <p:nvPr/>
-        </p:nvSpPr>
-        <p:spPr>
-          <a:xfrm>
-            <a:off x="3766162" y="4609867"/>
-            <a:ext cx="1468649" cy="728495"/>
-          </a:xfrm>
-          <a:prstGeom prst="roundRect">
-            <a:avLst/>
-          </a:prstGeom>
-          <a:solidFill>
-            <a:srgbClr val="CEE1F2"/>
-          </a:solidFill>
-          <a:ln cap="rnd">
-            <a:round/>
-          </a:ln>
-          <a:effectLst>
-            <a:outerShdw blurRad="50800" dist="38100" dir="2700000" algn="tl" rotWithShape="0">
-              <a:prstClr val="black">
-                <a:alpha val="40000"/>
-              </a:prstClr>
-            </a:outerShdw>
-          </a:effectLst>
-        </p:spPr>
-        <p:style>
-          <a:lnRef idx="2">
-            <a:schemeClr val="accent1">
-              <a:shade val="50000"/>
-            </a:schemeClr>
-          </a:lnRef>
-          <a:fillRef idx="1">
-            <a:schemeClr val="accent1"/>
-          </a:fillRef>
-          <a:effectRef idx="0">
-            <a:schemeClr val="accent1"/>
-          </a:effectRef>
-          <a:fontRef idx="minor">
-            <a:schemeClr val="lt1"/>
-          </a:fontRef>
-        </p:style>
-        <p:txBody>
-          <a:bodyPr rtlCol="0" anchor="ctr"/>
-          <a:lstStyle/>
-          <a:p>
-            <a:pPr algn="ctr"/>
-            <a:r>
-              <a:rPr lang="en-US" dirty="0">
-                <a:solidFill>
-                  <a:schemeClr val="tx1"/>
-                </a:solidFill>
-              </a:rPr>
-              <a:t>Healthcare Service</a:t>
-            </a:r>
-            <a:endParaRPr lang="en-AU" dirty="0">
-              <a:solidFill>
-                <a:schemeClr val="tx1"/>
-              </a:solidFill>
-            </a:endParaRPr>
-          </a:p>
-        </p:txBody>
-      </p:sp>
-      <p:sp>
-        <p:nvSpPr>
-          <p:cNvPr id="34" name="Rounded Rectangle 36"/>
-          <p:cNvSpPr/>
-          <p:nvPr/>
-        </p:nvSpPr>
-        <p:spPr>
-          <a:xfrm>
-            <a:off x="7253084" y="3682138"/>
-            <a:ext cx="909353" cy="405321"/>
-          </a:xfrm>
-          <a:prstGeom prst="roundRect">
-            <a:avLst/>
-          </a:prstGeom>
-          <a:solidFill>
-            <a:srgbClr val="71A7D9"/>
-          </a:solidFill>
-          <a:ln cap="rnd">
-            <a:round/>
-          </a:ln>
-          <a:effectLst>
-            <a:outerShdw blurRad="50800" dist="38100" dir="2700000" algn="tl" rotWithShape="0">
-              <a:prstClr val="black">
-                <a:alpha val="40000"/>
-              </a:prstClr>
-            </a:outerShdw>
-          </a:effectLst>
-        </p:spPr>
-        <p:style>
-          <a:lnRef idx="2">
-            <a:schemeClr val="accent1">
-              <a:shade val="50000"/>
-            </a:schemeClr>
-          </a:lnRef>
-          <a:fillRef idx="1">
-            <a:schemeClr val="accent1"/>
-          </a:fillRef>
-          <a:effectRef idx="0">
-            <a:schemeClr val="accent1"/>
-          </a:effectRef>
-          <a:fontRef idx="minor">
-            <a:schemeClr val="lt1"/>
-          </a:fontRef>
-        </p:style>
-        <p:txBody>
-          <a:bodyPr rtlCol="0" anchor="ctr"/>
-          <a:lstStyle/>
-          <a:p>
-            <a:pPr algn="ctr"/>
-            <a:r>
-              <a:rPr lang="en-US" dirty="0">
-                <a:solidFill>
-                  <a:schemeClr val="tx1"/>
-                </a:solidFill>
-              </a:rPr>
-              <a:t>Role</a:t>
-            </a:r>
-          </a:p>
-        </p:txBody>
-      </p:sp>
-      <p:cxnSp>
-        <p:nvCxnSpPr>
-          <p:cNvPr id="71" name="Elbow Connector 37"/>
-          <p:cNvCxnSpPr/>
-          <p:nvPr/>
-        </p:nvCxnSpPr>
-        <p:spPr>
-          <a:xfrm>
-            <a:off x="5771920" y="3884798"/>
-            <a:ext cx="415652" cy="463854"/>
-          </a:xfrm>
-          <a:prstGeom prst="straightConnector1">
-            <a:avLst/>
-          </a:prstGeom>
-          <a:ln>
-            <a:tailEnd type="triangle"/>
-          </a:ln>
-        </p:spPr>
-        <p:style>
-          <a:lnRef idx="3">
-            <a:schemeClr val="dk1"/>
-          </a:lnRef>
-          <a:fillRef idx="0">
-            <a:schemeClr val="dk1"/>
-          </a:fillRef>
-          <a:effectRef idx="2">
-            <a:schemeClr val="dk1"/>
-          </a:effectRef>
-          <a:fontRef idx="minor">
-            <a:schemeClr val="tx1"/>
-          </a:fontRef>
-        </p:style>
-      </p:cxnSp>
-      <p:sp>
-        <p:nvSpPr>
-          <p:cNvPr id="8" name="Rounded Rectangle 9"/>
-          <p:cNvSpPr/>
-          <p:nvPr/>
-        </p:nvSpPr>
-        <p:spPr>
-          <a:xfrm>
-            <a:off x="4449999" y="3233853"/>
             <a:ext cx="1468649" cy="728495"/>
           </a:xfrm>
           <a:prstGeom prst="roundRect">
@@ -8947,6 +8276,677 @@
             <a:pPr algn="ctr"/>
             <a:r>
               <a:rPr lang="en-US" sz="1600" dirty="0"/>
+              <a:t>Endpoint</a:t>
+            </a:r>
+            <a:endParaRPr lang="en-AU" sz="1600" dirty="0"/>
+          </a:p>
+        </p:txBody>
+      </p:sp>
+      <p:sp>
+        <p:nvSpPr>
+          <p:cNvPr id="22" name="Rounded Rectangle 23"/>
+          <p:cNvSpPr/>
+          <p:nvPr/>
+        </p:nvSpPr>
+        <p:spPr>
+          <a:xfrm>
+            <a:off x="7814362" y="5879813"/>
+            <a:ext cx="1468649" cy="728495"/>
+          </a:xfrm>
+          <a:prstGeom prst="roundRect">
+            <a:avLst/>
+          </a:prstGeom>
+          <a:solidFill>
+            <a:schemeClr val="accent3">
+              <a:alpha val="50000"/>
+            </a:schemeClr>
+          </a:solidFill>
+          <a:ln>
+            <a:noFill/>
+          </a:ln>
+        </p:spPr>
+        <p:style>
+          <a:lnRef idx="0">
+            <a:scrgbClr r="0" g="0" b="0"/>
+          </a:lnRef>
+          <a:fillRef idx="0">
+            <a:scrgbClr r="0" g="0" b="0"/>
+          </a:fillRef>
+          <a:effectRef idx="0">
+            <a:scrgbClr r="0" g="0" b="0"/>
+          </a:effectRef>
+          <a:fontRef idx="minor">
+            <a:schemeClr val="lt1"/>
+          </a:fontRef>
+        </p:style>
+        <p:txBody>
+          <a:bodyPr lIns="36000" rIns="36000" rtlCol="0" anchor="ctr"/>
+          <a:lstStyle/>
+          <a:p>
+            <a:pPr algn="ctr"/>
+            <a:r>
+              <a:rPr lang="en-US" sz="1600" dirty="0"/>
+              <a:t>Questionnaire</a:t>
+            </a:r>
+            <a:endParaRPr lang="en-AU" sz="1600" dirty="0"/>
+          </a:p>
+        </p:txBody>
+      </p:sp>
+      <p:sp>
+        <p:nvSpPr>
+          <p:cNvPr id="23" name="Rounded Rectangle 24"/>
+          <p:cNvSpPr/>
+          <p:nvPr/>
+        </p:nvSpPr>
+        <p:spPr>
+          <a:xfrm>
+            <a:off x="9503227" y="5879813"/>
+            <a:ext cx="1468649" cy="728495"/>
+          </a:xfrm>
+          <a:prstGeom prst="roundRect">
+            <a:avLst/>
+          </a:prstGeom>
+          <a:solidFill>
+            <a:schemeClr val="accent3">
+              <a:alpha val="50000"/>
+            </a:schemeClr>
+          </a:solidFill>
+          <a:ln>
+            <a:noFill/>
+          </a:ln>
+        </p:spPr>
+        <p:style>
+          <a:lnRef idx="0">
+            <a:scrgbClr r="0" g="0" b="0"/>
+          </a:lnRef>
+          <a:fillRef idx="0">
+            <a:scrgbClr r="0" g="0" b="0"/>
+          </a:fillRef>
+          <a:effectRef idx="0">
+            <a:scrgbClr r="0" g="0" b="0"/>
+          </a:effectRef>
+          <a:fontRef idx="minor">
+            <a:schemeClr val="lt1"/>
+          </a:fontRef>
+        </p:style>
+        <p:txBody>
+          <a:bodyPr rtlCol="0" anchor="ctr"/>
+          <a:lstStyle/>
+          <a:p>
+            <a:r>
+              <a:rPr lang="en-US" sz="1600" dirty="0"/>
+              <a:t>…</a:t>
+            </a:r>
+            <a:endParaRPr lang="en-AU" sz="1600" dirty="0"/>
+          </a:p>
+        </p:txBody>
+      </p:sp>
+      <p:sp>
+        <p:nvSpPr>
+          <p:cNvPr id="24" name="Rounded Rectangle 26"/>
+          <p:cNvSpPr/>
+          <p:nvPr/>
+        </p:nvSpPr>
+        <p:spPr>
+          <a:xfrm>
+            <a:off x="1058910" y="5879813"/>
+            <a:ext cx="1468649" cy="728495"/>
+          </a:xfrm>
+          <a:prstGeom prst="roundRect">
+            <a:avLst/>
+          </a:prstGeom>
+        </p:spPr>
+        <p:style>
+          <a:lnRef idx="0">
+            <a:schemeClr val="accent3"/>
+          </a:lnRef>
+          <a:fillRef idx="3">
+            <a:schemeClr val="accent3"/>
+          </a:fillRef>
+          <a:effectRef idx="3">
+            <a:schemeClr val="accent3"/>
+          </a:effectRef>
+          <a:fontRef idx="minor">
+            <a:schemeClr val="lt1"/>
+          </a:fontRef>
+        </p:style>
+        <p:txBody>
+          <a:bodyPr rtlCol="0" anchor="ctr"/>
+          <a:lstStyle/>
+          <a:p>
+            <a:pPr algn="ctr"/>
+            <a:r>
+              <a:rPr lang="en-US" sz="1600" dirty="0"/>
+              <a:t>Document Reference</a:t>
+            </a:r>
+            <a:endParaRPr lang="en-AU" sz="1600" dirty="0"/>
+          </a:p>
+        </p:txBody>
+      </p:sp>
+      <p:sp>
+        <p:nvSpPr>
+          <p:cNvPr id="4" name="Rounded Rectangle 5"/>
+          <p:cNvSpPr/>
+          <p:nvPr/>
+        </p:nvSpPr>
+        <p:spPr>
+          <a:xfrm>
+            <a:off x="3766162" y="1866667"/>
+            <a:ext cx="1468649" cy="728495"/>
+          </a:xfrm>
+          <a:prstGeom prst="roundRect">
+            <a:avLst/>
+          </a:prstGeom>
+          <a:solidFill>
+            <a:srgbClr val="CEE1F2"/>
+          </a:solidFill>
+          <a:ln cap="rnd">
+            <a:round/>
+          </a:ln>
+          <a:effectLst>
+            <a:outerShdw blurRad="50800" dist="38100" dir="2700000" algn="tl" rotWithShape="0">
+              <a:prstClr val="black">
+                <a:alpha val="40000"/>
+              </a:prstClr>
+            </a:outerShdw>
+          </a:effectLst>
+        </p:spPr>
+        <p:style>
+          <a:lnRef idx="2">
+            <a:schemeClr val="accent1">
+              <a:shade val="50000"/>
+            </a:schemeClr>
+          </a:lnRef>
+          <a:fillRef idx="1">
+            <a:schemeClr val="accent1"/>
+          </a:fillRef>
+          <a:effectRef idx="0">
+            <a:schemeClr val="accent1"/>
+          </a:effectRef>
+          <a:fontRef idx="minor">
+            <a:schemeClr val="lt1"/>
+          </a:fontRef>
+        </p:style>
+        <p:txBody>
+          <a:bodyPr rtlCol="0" anchor="ctr"/>
+          <a:lstStyle/>
+          <a:p>
+            <a:pPr algn="ctr"/>
+            <a:r>
+              <a:rPr lang="en-US" dirty="0">
+                <a:solidFill>
+                  <a:schemeClr val="tx1"/>
+                </a:solidFill>
+              </a:rPr>
+              <a:t>Organization</a:t>
+            </a:r>
+            <a:endParaRPr lang="en-AU" dirty="0">
+              <a:solidFill>
+                <a:schemeClr val="tx1"/>
+              </a:solidFill>
+            </a:endParaRPr>
+          </a:p>
+        </p:txBody>
+      </p:sp>
+      <p:sp>
+        <p:nvSpPr>
+          <p:cNvPr id="5" name="Rounded Rectangle 6"/>
+          <p:cNvSpPr/>
+          <p:nvPr/>
+        </p:nvSpPr>
+        <p:spPr>
+          <a:xfrm>
+            <a:off x="2071253" y="3233853"/>
+            <a:ext cx="1468649" cy="728495"/>
+          </a:xfrm>
+          <a:prstGeom prst="roundRect">
+            <a:avLst/>
+          </a:prstGeom>
+          <a:solidFill>
+            <a:srgbClr val="CEE1F2"/>
+          </a:solidFill>
+          <a:ln cap="rnd">
+            <a:round/>
+          </a:ln>
+          <a:effectLst>
+            <a:outerShdw blurRad="50800" dist="38100" dir="2700000" algn="tl" rotWithShape="0">
+              <a:prstClr val="black">
+                <a:alpha val="40000"/>
+              </a:prstClr>
+            </a:outerShdw>
+          </a:effectLst>
+        </p:spPr>
+        <p:style>
+          <a:lnRef idx="2">
+            <a:schemeClr val="accent1">
+              <a:shade val="50000"/>
+            </a:schemeClr>
+          </a:lnRef>
+          <a:fillRef idx="1">
+            <a:schemeClr val="accent1"/>
+          </a:fillRef>
+          <a:effectRef idx="0">
+            <a:schemeClr val="accent1"/>
+          </a:effectRef>
+          <a:fontRef idx="minor">
+            <a:schemeClr val="lt1"/>
+          </a:fontRef>
+        </p:style>
+        <p:txBody>
+          <a:bodyPr rtlCol="0" anchor="ctr"/>
+          <a:lstStyle/>
+          <a:p>
+            <a:pPr algn="ctr"/>
+            <a:r>
+              <a:rPr lang="en-US" dirty="0">
+                <a:solidFill>
+                  <a:schemeClr val="tx1"/>
+                </a:solidFill>
+              </a:rPr>
+              <a:t>Location</a:t>
+            </a:r>
+            <a:endParaRPr lang="en-AU" dirty="0">
+              <a:solidFill>
+                <a:schemeClr val="tx1"/>
+              </a:solidFill>
+            </a:endParaRPr>
+          </a:p>
+        </p:txBody>
+      </p:sp>
+      <p:sp>
+        <p:nvSpPr>
+          <p:cNvPr id="6" name="Rounded Rectangle 7"/>
+          <p:cNvSpPr/>
+          <p:nvPr/>
+        </p:nvSpPr>
+        <p:spPr>
+          <a:xfrm>
+            <a:off x="6785901" y="3233853"/>
+            <a:ext cx="1468649" cy="728495"/>
+          </a:xfrm>
+          <a:prstGeom prst="roundRect">
+            <a:avLst/>
+          </a:prstGeom>
+          <a:solidFill>
+            <a:srgbClr val="CEE1F2"/>
+          </a:solidFill>
+          <a:ln cap="rnd">
+            <a:round/>
+          </a:ln>
+          <a:effectLst>
+            <a:outerShdw blurRad="50800" dist="38100" dir="2700000" algn="tl" rotWithShape="0">
+              <a:prstClr val="black">
+                <a:alpha val="40000"/>
+              </a:prstClr>
+            </a:outerShdw>
+          </a:effectLst>
+        </p:spPr>
+        <p:style>
+          <a:lnRef idx="2">
+            <a:schemeClr val="accent1">
+              <a:shade val="50000"/>
+            </a:schemeClr>
+          </a:lnRef>
+          <a:fillRef idx="1">
+            <a:schemeClr val="accent1"/>
+          </a:fillRef>
+          <a:effectRef idx="0">
+            <a:schemeClr val="accent1"/>
+          </a:effectRef>
+          <a:fontRef idx="minor">
+            <a:schemeClr val="lt1"/>
+          </a:fontRef>
+        </p:style>
+        <p:txBody>
+          <a:bodyPr rtlCol="0" anchor="ctr"/>
+          <a:lstStyle/>
+          <a:p>
+            <a:pPr algn="ctr"/>
+            <a:r>
+              <a:rPr lang="en-US" dirty="0">
+                <a:solidFill>
+                  <a:schemeClr val="tx1"/>
+                </a:solidFill>
+              </a:rPr>
+              <a:t>Practitioner</a:t>
+            </a:r>
+          </a:p>
+          <a:p>
+            <a:pPr algn="ctr"/>
+            <a:endParaRPr lang="en-AU" dirty="0">
+              <a:solidFill>
+                <a:schemeClr val="tx1"/>
+              </a:solidFill>
+            </a:endParaRPr>
+          </a:p>
+        </p:txBody>
+      </p:sp>
+      <p:sp>
+        <p:nvSpPr>
+          <p:cNvPr id="7" name="Rounded Rectangle 8"/>
+          <p:cNvSpPr/>
+          <p:nvPr/>
+        </p:nvSpPr>
+        <p:spPr>
+          <a:xfrm>
+            <a:off x="3766162" y="4609867"/>
+            <a:ext cx="1468649" cy="728495"/>
+          </a:xfrm>
+          <a:prstGeom prst="roundRect">
+            <a:avLst/>
+          </a:prstGeom>
+          <a:solidFill>
+            <a:srgbClr val="CEE1F2"/>
+          </a:solidFill>
+          <a:ln cap="rnd">
+            <a:round/>
+          </a:ln>
+          <a:effectLst>
+            <a:outerShdw blurRad="50800" dist="38100" dir="2700000" algn="tl" rotWithShape="0">
+              <a:prstClr val="black">
+                <a:alpha val="40000"/>
+              </a:prstClr>
+            </a:outerShdw>
+          </a:effectLst>
+        </p:spPr>
+        <p:style>
+          <a:lnRef idx="2">
+            <a:schemeClr val="accent1">
+              <a:shade val="50000"/>
+            </a:schemeClr>
+          </a:lnRef>
+          <a:fillRef idx="1">
+            <a:schemeClr val="accent1"/>
+          </a:fillRef>
+          <a:effectRef idx="0">
+            <a:schemeClr val="accent1"/>
+          </a:effectRef>
+          <a:fontRef idx="minor">
+            <a:schemeClr val="lt1"/>
+          </a:fontRef>
+        </p:style>
+        <p:txBody>
+          <a:bodyPr rtlCol="0" anchor="ctr"/>
+          <a:lstStyle/>
+          <a:p>
+            <a:pPr algn="ctr"/>
+            <a:r>
+              <a:rPr lang="en-US" dirty="0">
+                <a:solidFill>
+                  <a:schemeClr val="tx1"/>
+                </a:solidFill>
+              </a:rPr>
+              <a:t>Healthcare Service</a:t>
+            </a:r>
+            <a:endParaRPr lang="en-AU" dirty="0">
+              <a:solidFill>
+                <a:schemeClr val="tx1"/>
+              </a:solidFill>
+            </a:endParaRPr>
+          </a:p>
+        </p:txBody>
+      </p:sp>
+      <p:sp>
+        <p:nvSpPr>
+          <p:cNvPr id="34" name="Rounded Rectangle 36"/>
+          <p:cNvSpPr/>
+          <p:nvPr/>
+        </p:nvSpPr>
+        <p:spPr>
+          <a:xfrm>
+            <a:off x="7253084" y="3682138"/>
+            <a:ext cx="909353" cy="405321"/>
+          </a:xfrm>
+          <a:prstGeom prst="roundRect">
+            <a:avLst/>
+          </a:prstGeom>
+          <a:solidFill>
+            <a:srgbClr val="71A7D9"/>
+          </a:solidFill>
+          <a:ln cap="rnd">
+            <a:round/>
+          </a:ln>
+          <a:effectLst>
+            <a:outerShdw blurRad="50800" dist="38100" dir="2700000" algn="tl" rotWithShape="0">
+              <a:prstClr val="black">
+                <a:alpha val="40000"/>
+              </a:prstClr>
+            </a:outerShdw>
+          </a:effectLst>
+        </p:spPr>
+        <p:style>
+          <a:lnRef idx="2">
+            <a:schemeClr val="accent1">
+              <a:shade val="50000"/>
+            </a:schemeClr>
+          </a:lnRef>
+          <a:fillRef idx="1">
+            <a:schemeClr val="accent1"/>
+          </a:fillRef>
+          <a:effectRef idx="0">
+            <a:schemeClr val="accent1"/>
+          </a:effectRef>
+          <a:fontRef idx="minor">
+            <a:schemeClr val="lt1"/>
+          </a:fontRef>
+        </p:style>
+        <p:txBody>
+          <a:bodyPr rtlCol="0" anchor="ctr"/>
+          <a:lstStyle/>
+          <a:p>
+            <a:pPr algn="ctr"/>
+            <a:r>
+              <a:rPr lang="en-US" dirty="0">
+                <a:solidFill>
+                  <a:schemeClr val="tx1"/>
+                </a:solidFill>
+              </a:rPr>
+              <a:t>Role</a:t>
+            </a:r>
+          </a:p>
+        </p:txBody>
+      </p:sp>
+      <p:cxnSp>
+        <p:nvCxnSpPr>
+          <p:cNvPr id="68" name="Elbow Connector 37"/>
+          <p:cNvCxnSpPr/>
+          <p:nvPr/>
+        </p:nvCxnSpPr>
+        <p:spPr>
+          <a:xfrm flipH="1">
+            <a:off x="7392918" y="3988403"/>
+            <a:ext cx="181668" cy="438057"/>
+          </a:xfrm>
+          <a:prstGeom prst="straightConnector1">
+            <a:avLst/>
+          </a:prstGeom>
+          <a:ln w="19050" cap="flat" cmpd="sng" algn="ctr">
+            <a:solidFill>
+              <a:schemeClr val="accent1"/>
+            </a:solidFill>
+            <a:prstDash val="dash"/>
+            <a:round/>
+            <a:headEnd type="none" w="med" len="med"/>
+            <a:tailEnd type="triangle" w="med" len="med"/>
+          </a:ln>
+        </p:spPr>
+        <p:style>
+          <a:lnRef idx="0">
+            <a:scrgbClr r="0" g="0" b="0"/>
+          </a:lnRef>
+          <a:fillRef idx="0">
+            <a:scrgbClr r="0" g="0" b="0"/>
+          </a:fillRef>
+          <a:effectRef idx="0">
+            <a:scrgbClr r="0" g="0" b="0"/>
+          </a:effectRef>
+          <a:fontRef idx="minor">
+            <a:schemeClr val="tx1"/>
+          </a:fontRef>
+        </p:style>
+      </p:cxnSp>
+      <p:cxnSp>
+        <p:nvCxnSpPr>
+          <p:cNvPr id="71" name="Elbow Connector 37"/>
+          <p:cNvCxnSpPr/>
+          <p:nvPr/>
+        </p:nvCxnSpPr>
+        <p:spPr>
+          <a:xfrm>
+            <a:off x="5771920" y="3884798"/>
+            <a:ext cx="415652" cy="463854"/>
+          </a:xfrm>
+          <a:prstGeom prst="straightConnector1">
+            <a:avLst/>
+          </a:prstGeom>
+          <a:ln w="19050" cap="flat" cmpd="sng" algn="ctr">
+            <a:solidFill>
+              <a:schemeClr val="accent1"/>
+            </a:solidFill>
+            <a:prstDash val="dash"/>
+            <a:round/>
+            <a:headEnd type="none" w="med" len="med"/>
+            <a:tailEnd type="triangle" w="med" len="med"/>
+          </a:ln>
+        </p:spPr>
+        <p:style>
+          <a:lnRef idx="0">
+            <a:scrgbClr r="0" g="0" b="0"/>
+          </a:lnRef>
+          <a:fillRef idx="0">
+            <a:scrgbClr r="0" g="0" b="0"/>
+          </a:fillRef>
+          <a:effectRef idx="0">
+            <a:scrgbClr r="0" g="0" b="0"/>
+          </a:effectRef>
+          <a:fontRef idx="minor">
+            <a:schemeClr val="tx1"/>
+          </a:fontRef>
+        </p:style>
+      </p:cxnSp>
+      <p:cxnSp>
+        <p:nvCxnSpPr>
+          <p:cNvPr id="74" name="Elbow Connector 37"/>
+          <p:cNvCxnSpPr/>
+          <p:nvPr/>
+        </p:nvCxnSpPr>
+        <p:spPr>
+          <a:xfrm>
+            <a:off x="5093063" y="4974114"/>
+            <a:ext cx="1094509" cy="0"/>
+          </a:xfrm>
+          <a:prstGeom prst="straightConnector1">
+            <a:avLst/>
+          </a:prstGeom>
+          <a:ln w="19050" cap="flat" cmpd="sng" algn="ctr">
+            <a:solidFill>
+              <a:schemeClr val="accent1"/>
+            </a:solidFill>
+            <a:prstDash val="dash"/>
+            <a:round/>
+            <a:headEnd type="none" w="med" len="med"/>
+            <a:tailEnd type="triangle" w="med" len="med"/>
+          </a:ln>
+        </p:spPr>
+        <p:style>
+          <a:lnRef idx="0">
+            <a:scrgbClr r="0" g="0" b="0"/>
+          </a:lnRef>
+          <a:fillRef idx="0">
+            <a:scrgbClr r="0" g="0" b="0"/>
+          </a:fillRef>
+          <a:effectRef idx="0">
+            <a:scrgbClr r="0" g="0" b="0"/>
+          </a:effectRef>
+          <a:fontRef idx="minor">
+            <a:schemeClr val="tx1"/>
+          </a:fontRef>
+        </p:style>
+      </p:cxnSp>
+      <p:cxnSp>
+        <p:nvCxnSpPr>
+          <p:cNvPr id="80" name="Elbow Connector 37"/>
+          <p:cNvCxnSpPr/>
+          <p:nvPr/>
+        </p:nvCxnSpPr>
+        <p:spPr>
+          <a:xfrm>
+            <a:off x="3504430" y="3767012"/>
+            <a:ext cx="2475316" cy="915780"/>
+          </a:xfrm>
+          <a:prstGeom prst="straightConnector1">
+            <a:avLst/>
+          </a:prstGeom>
+          <a:ln w="19050" cap="flat" cmpd="sng" algn="ctr">
+            <a:solidFill>
+              <a:schemeClr val="accent1"/>
+            </a:solidFill>
+            <a:prstDash val="dash"/>
+            <a:round/>
+            <a:headEnd type="none" w="med" len="med"/>
+            <a:tailEnd type="triangle" w="med" len="med"/>
+          </a:ln>
+        </p:spPr>
+        <p:style>
+          <a:lnRef idx="0">
+            <a:scrgbClr r="0" g="0" b="0"/>
+          </a:lnRef>
+          <a:fillRef idx="0">
+            <a:scrgbClr r="0" g="0" b="0"/>
+          </a:fillRef>
+          <a:effectRef idx="0">
+            <a:scrgbClr r="0" g="0" b="0"/>
+          </a:effectRef>
+          <a:fontRef idx="minor">
+            <a:schemeClr val="tx1"/>
+          </a:fontRef>
+        </p:style>
+      </p:cxnSp>
+      <p:sp>
+        <p:nvSpPr>
+          <p:cNvPr id="8" name="Rounded Rectangle 9"/>
+          <p:cNvSpPr/>
+          <p:nvPr/>
+        </p:nvSpPr>
+        <p:spPr>
+          <a:xfrm>
+            <a:off x="4449999" y="3233853"/>
+            <a:ext cx="1468649" cy="728495"/>
+          </a:xfrm>
+          <a:prstGeom prst="roundRect">
+            <a:avLst/>
+          </a:prstGeom>
+          <a:solidFill>
+            <a:schemeClr val="accent5">
+              <a:lumMod val="60000"/>
+              <a:lumOff val="40000"/>
+            </a:schemeClr>
+          </a:solidFill>
+          <a:ln>
+            <a:noFill/>
+          </a:ln>
+        </p:spPr>
+        <p:style>
+          <a:lnRef idx="0">
+            <a:scrgbClr r="0" g="0" b="0"/>
+          </a:lnRef>
+          <a:fillRef idx="0">
+            <a:scrgbClr r="0" g="0" b="0"/>
+          </a:fillRef>
+          <a:effectRef idx="0">
+            <a:scrgbClr r="0" g="0" b="0"/>
+          </a:effectRef>
+          <a:fontRef idx="minor">
+            <a:schemeClr val="lt1"/>
+          </a:fontRef>
+        </p:style>
+        <p:txBody>
+          <a:bodyPr rtlCol="0" anchor="ctr"/>
+          <a:lstStyle/>
+          <a:p>
+            <a:pPr algn="ctr"/>
+            <a:r>
+              <a:rPr lang="en-US" sz="1600" dirty="0"/>
               <a:t>Practitioner Role</a:t>
             </a:r>
             <a:endParaRPr lang="en-AU" sz="1600" dirty="0"/>
@@ -8978,7 +8978,7 @@
     </p:spTree>
     <p:extLst>
       <p:ext uri="{BB962C8B-B14F-4D97-AF65-F5344CB8AC3E}">
-        <p14:creationId xmlns:p14="http://schemas.microsoft.com/office/powerpoint/2010/main" val="3766799555"/>
+        <p14:creationId xmlns:p14="http://schemas.microsoft.com/office/powerpoint/2010/main" val="2995983434"/>
       </p:ext>
     </p:extLst>
   </p:cSld>

</xml_diff>

<commit_message>
Trackers: 11466, 11469, 11248, 10636, 11470
git-svn-id: http://gforge.hl7.org/svn/fhir/trunk/build@10352 2f0db536-2c49-4257-a3fa-e771ed206c19
</commit_message>
<xml_diff>
--- a/images/source/administration-module-resources.pptx
+++ b/images/source/administration-module-resources.pptx
@@ -251,7 +251,7 @@
           <a:p>
             <a:fld id="{DE4E7392-00FF-4A5B-A4FB-CA939482D6BD}" type="datetimeFigureOut">
               <a:rPr lang="en-US" smtClean="0"/>
-              <a:t>10/5/2016</a:t>
+              <a:t>11/30/2016</a:t>
             </a:fld>
             <a:endParaRPr lang="en-US"/>
           </a:p>
@@ -419,7 +419,7 @@
           <a:p>
             <a:fld id="{DE4E7392-00FF-4A5B-A4FB-CA939482D6BD}" type="datetimeFigureOut">
               <a:rPr lang="en-US" smtClean="0"/>
-              <a:t>10/5/2016</a:t>
+              <a:t>11/30/2016</a:t>
             </a:fld>
             <a:endParaRPr lang="en-US"/>
           </a:p>
@@ -597,7 +597,7 @@
           <a:p>
             <a:fld id="{DE4E7392-00FF-4A5B-A4FB-CA939482D6BD}" type="datetimeFigureOut">
               <a:rPr lang="en-US" smtClean="0"/>
-              <a:t>10/5/2016</a:t>
+              <a:t>11/30/2016</a:t>
             </a:fld>
             <a:endParaRPr lang="en-US"/>
           </a:p>
@@ -765,7 +765,7 @@
           <a:p>
             <a:fld id="{DE4E7392-00FF-4A5B-A4FB-CA939482D6BD}" type="datetimeFigureOut">
               <a:rPr lang="en-US" smtClean="0"/>
-              <a:t>10/5/2016</a:t>
+              <a:t>11/30/2016</a:t>
             </a:fld>
             <a:endParaRPr lang="en-US"/>
           </a:p>
@@ -1010,7 +1010,7 @@
           <a:p>
             <a:fld id="{DE4E7392-00FF-4A5B-A4FB-CA939482D6BD}" type="datetimeFigureOut">
               <a:rPr lang="en-US" smtClean="0"/>
-              <a:t>10/5/2016</a:t>
+              <a:t>11/30/2016</a:t>
             </a:fld>
             <a:endParaRPr lang="en-US"/>
           </a:p>
@@ -1239,7 +1239,7 @@
           <a:p>
             <a:fld id="{DE4E7392-00FF-4A5B-A4FB-CA939482D6BD}" type="datetimeFigureOut">
               <a:rPr lang="en-US" smtClean="0"/>
-              <a:t>10/5/2016</a:t>
+              <a:t>11/30/2016</a:t>
             </a:fld>
             <a:endParaRPr lang="en-US"/>
           </a:p>
@@ -1603,7 +1603,7 @@
           <a:p>
             <a:fld id="{DE4E7392-00FF-4A5B-A4FB-CA939482D6BD}" type="datetimeFigureOut">
               <a:rPr lang="en-US" smtClean="0"/>
-              <a:t>10/5/2016</a:t>
+              <a:t>11/30/2016</a:t>
             </a:fld>
             <a:endParaRPr lang="en-US"/>
           </a:p>
@@ -1720,7 +1720,7 @@
           <a:p>
             <a:fld id="{DE4E7392-00FF-4A5B-A4FB-CA939482D6BD}" type="datetimeFigureOut">
               <a:rPr lang="en-US" smtClean="0"/>
-              <a:t>10/5/2016</a:t>
+              <a:t>11/30/2016</a:t>
             </a:fld>
             <a:endParaRPr lang="en-US"/>
           </a:p>
@@ -1815,7 +1815,7 @@
           <a:p>
             <a:fld id="{DE4E7392-00FF-4A5B-A4FB-CA939482D6BD}" type="datetimeFigureOut">
               <a:rPr lang="en-US" smtClean="0"/>
-              <a:t>10/5/2016</a:t>
+              <a:t>11/30/2016</a:t>
             </a:fld>
             <a:endParaRPr lang="en-US"/>
           </a:p>
@@ -2090,7 +2090,7 @@
           <a:p>
             <a:fld id="{DE4E7392-00FF-4A5B-A4FB-CA939482D6BD}" type="datetimeFigureOut">
               <a:rPr lang="en-US" smtClean="0"/>
-              <a:t>10/5/2016</a:t>
+              <a:t>11/30/2016</a:t>
             </a:fld>
             <a:endParaRPr lang="en-US"/>
           </a:p>
@@ -2342,7 +2342,7 @@
           <a:p>
             <a:fld id="{DE4E7392-00FF-4A5B-A4FB-CA939482D6BD}" type="datetimeFigureOut">
               <a:rPr lang="en-US" smtClean="0"/>
-              <a:t>10/5/2016</a:t>
+              <a:t>11/30/2016</a:t>
             </a:fld>
             <a:endParaRPr lang="en-US"/>
           </a:p>
@@ -2553,7 +2553,7 @@
           <a:p>
             <a:fld id="{DE4E7392-00FF-4A5B-A4FB-CA939482D6BD}" type="datetimeFigureOut">
               <a:rPr lang="en-US" smtClean="0"/>
-              <a:t>10/5/2016</a:t>
+              <a:t>11/30/2016</a:t>
             </a:fld>
             <a:endParaRPr lang="en-US"/>
           </a:p>
@@ -3469,6 +3469,41 @@
           </a:p>
         </p:txBody>
       </p:sp>
+      <p:cxnSp>
+        <p:nvCxnSpPr>
+          <p:cNvPr id="13" name="Elbow Connector 37"/>
+          <p:cNvCxnSpPr>
+            <a:stCxn id="18" idx="1"/>
+          </p:cNvCxnSpPr>
+          <p:nvPr/>
+        </p:nvCxnSpPr>
+        <p:spPr>
+          <a:xfrm flipH="1">
+            <a:off x="4481565" y="3168276"/>
+            <a:ext cx="508355" cy="1"/>
+          </a:xfrm>
+          <a:prstGeom prst="straightConnector1">
+            <a:avLst/>
+          </a:prstGeom>
+          <a:ln>
+            <a:tailEnd type="triangle"/>
+          </a:ln>
+        </p:spPr>
+        <p:style>
+          <a:lnRef idx="3">
+            <a:schemeClr val="dk1"/>
+          </a:lnRef>
+          <a:fillRef idx="0">
+            <a:schemeClr val="dk1"/>
+          </a:fillRef>
+          <a:effectRef idx="2">
+            <a:schemeClr val="dk1"/>
+          </a:effectRef>
+          <a:fontRef idx="minor">
+            <a:schemeClr val="tx1"/>
+          </a:fontRef>
+        </p:style>
+      </p:cxnSp>
     </p:spTree>
     <p:extLst>
       <p:ext uri="{BB962C8B-B14F-4D97-AF65-F5344CB8AC3E}">
@@ -6265,39 +6300,6 @@
       </p:grpSpPr>
       <p:cxnSp>
         <p:nvCxnSpPr>
-          <p:cNvPr id="68" name="Elbow Connector 37"/>
-          <p:cNvCxnSpPr/>
-          <p:nvPr/>
-        </p:nvCxnSpPr>
-        <p:spPr>
-          <a:xfrm flipH="1">
-            <a:off x="7392918" y="3988403"/>
-            <a:ext cx="181668" cy="438057"/>
-          </a:xfrm>
-          <a:prstGeom prst="straightConnector1">
-            <a:avLst/>
-          </a:prstGeom>
-          <a:ln>
-            <a:tailEnd type="triangle"/>
-          </a:ln>
-        </p:spPr>
-        <p:style>
-          <a:lnRef idx="3">
-            <a:schemeClr val="dk1"/>
-          </a:lnRef>
-          <a:fillRef idx="0">
-            <a:schemeClr val="dk1"/>
-          </a:fillRef>
-          <a:effectRef idx="2">
-            <a:schemeClr val="dk1"/>
-          </a:effectRef>
-          <a:fontRef idx="minor">
-            <a:schemeClr val="tx1"/>
-          </a:fontRef>
-        </p:style>
-      </p:cxnSp>
-      <p:cxnSp>
-        <p:nvCxnSpPr>
           <p:cNvPr id="74" name="Elbow Connector 37"/>
           <p:cNvCxnSpPr/>
           <p:nvPr/>
@@ -6310,19 +6312,25 @@
           <a:prstGeom prst="straightConnector1">
             <a:avLst/>
           </a:prstGeom>
-          <a:ln>
-            <a:tailEnd type="triangle"/>
-          </a:ln>
-        </p:spPr>
-        <p:style>
-          <a:lnRef idx="3">
-            <a:schemeClr val="dk1"/>
+          <a:ln w="19050" cap="flat" cmpd="sng" algn="ctr">
+            <a:solidFill>
+              <a:schemeClr val="accent1"/>
+            </a:solidFill>
+            <a:prstDash val="dash"/>
+            <a:round/>
+            <a:headEnd type="none" w="med" len="med"/>
+            <a:tailEnd type="triangle" w="med" len="med"/>
+          </a:ln>
+        </p:spPr>
+        <p:style>
+          <a:lnRef idx="0">
+            <a:scrgbClr r="0" g="0" b="0"/>
           </a:lnRef>
           <a:fillRef idx="0">
-            <a:schemeClr val="dk1"/>
-          </a:fillRef>
-          <a:effectRef idx="2">
-            <a:schemeClr val="dk1"/>
+            <a:scrgbClr r="0" g="0" b="0"/>
+          </a:fillRef>
+          <a:effectRef idx="0">
+            <a:scrgbClr r="0" g="0" b="0"/>
           </a:effectRef>
           <a:fontRef idx="minor">
             <a:schemeClr val="tx1"/>
@@ -6338,24 +6346,30 @@
         <p:spPr>
           <a:xfrm>
             <a:off x="3504430" y="3767012"/>
-            <a:ext cx="2475316" cy="915780"/>
+            <a:ext cx="2683142" cy="945145"/>
           </a:xfrm>
           <a:prstGeom prst="straightConnector1">
             <a:avLst/>
           </a:prstGeom>
-          <a:ln>
-            <a:tailEnd type="triangle"/>
-          </a:ln>
-        </p:spPr>
-        <p:style>
-          <a:lnRef idx="3">
-            <a:schemeClr val="dk1"/>
+          <a:ln w="19050" cap="flat" cmpd="sng" algn="ctr">
+            <a:solidFill>
+              <a:schemeClr val="accent1"/>
+            </a:solidFill>
+            <a:prstDash val="dash"/>
+            <a:round/>
+            <a:headEnd type="none" w="med" len="med"/>
+            <a:tailEnd type="triangle" w="med" len="med"/>
+          </a:ln>
+        </p:spPr>
+        <p:style>
+          <a:lnRef idx="0">
+            <a:scrgbClr r="0" g="0" b="0"/>
           </a:lnRef>
           <a:fillRef idx="0">
-            <a:schemeClr val="dk1"/>
-          </a:fillRef>
-          <a:effectRef idx="2">
-            <a:schemeClr val="dk1"/>
+            <a:scrgbClr r="0" g="0" b="0"/>
+          </a:fillRef>
+          <a:effectRef idx="0">
+            <a:scrgbClr r="0" g="0" b="0"/>
           </a:effectRef>
           <a:fontRef idx="minor">
             <a:schemeClr val="tx1"/>
@@ -6376,19 +6390,25 @@
           <a:prstGeom prst="straightConnector1">
             <a:avLst/>
           </a:prstGeom>
-          <a:ln>
-            <a:tailEnd type="triangle"/>
-          </a:ln>
-        </p:spPr>
-        <p:style>
-          <a:lnRef idx="3">
-            <a:schemeClr val="dk1"/>
+          <a:ln w="19050" cap="flat" cmpd="sng" algn="ctr">
+            <a:solidFill>
+              <a:schemeClr val="accent1"/>
+            </a:solidFill>
+            <a:prstDash val="dash"/>
+            <a:round/>
+            <a:headEnd type="none" w="med" len="med"/>
+            <a:tailEnd type="triangle" w="med" len="med"/>
+          </a:ln>
+        </p:spPr>
+        <p:style>
+          <a:lnRef idx="0">
+            <a:scrgbClr r="0" g="0" b="0"/>
           </a:lnRef>
           <a:fillRef idx="0">
-            <a:schemeClr val="dk1"/>
-          </a:fillRef>
-          <a:effectRef idx="2">
-            <a:schemeClr val="dk1"/>
+            <a:scrgbClr r="0" g="0" b="0"/>
+          </a:fillRef>
+          <a:effectRef idx="0">
+            <a:scrgbClr r="0" g="0" b="0"/>
           </a:effectRef>
           <a:fontRef idx="minor">
             <a:schemeClr val="tx1"/>
@@ -6402,9 +6422,9 @@
           <p:nvPr/>
         </p:nvCxnSpPr>
         <p:spPr>
-          <a:xfrm>
-            <a:off x="5093063" y="2453706"/>
-            <a:ext cx="116931" cy="678493"/>
+          <a:xfrm flipH="1" flipV="1">
+            <a:off x="5093063" y="2731625"/>
+            <a:ext cx="134841" cy="648184"/>
           </a:xfrm>
           <a:prstGeom prst="straightConnector1">
             <a:avLst/>
@@ -6435,75 +6455,9 @@
           <p:nvPr/>
         </p:nvCxnSpPr>
         <p:spPr>
-          <a:xfrm flipH="1">
-            <a:off x="3107245" y="2453706"/>
-            <a:ext cx="794328" cy="607358"/>
-          </a:xfrm>
-          <a:prstGeom prst="straightConnector1">
-            <a:avLst/>
-          </a:prstGeom>
-          <a:ln>
-            <a:tailEnd type="triangle"/>
-          </a:ln>
-        </p:spPr>
-        <p:style>
-          <a:lnRef idx="3">
-            <a:schemeClr val="dk1"/>
-          </a:lnRef>
-          <a:fillRef idx="0">
-            <a:schemeClr val="dk1"/>
-          </a:fillRef>
-          <a:effectRef idx="2">
-            <a:schemeClr val="dk1"/>
-          </a:effectRef>
-          <a:fontRef idx="minor">
-            <a:schemeClr val="tx1"/>
-          </a:fontRef>
-        </p:style>
-      </p:cxnSp>
-      <p:cxnSp>
-        <p:nvCxnSpPr>
-          <p:cNvPr id="11" name="Elbow Connector 37"/>
-          <p:cNvCxnSpPr/>
-          <p:nvPr/>
-        </p:nvCxnSpPr>
-        <p:spPr>
-          <a:xfrm flipH="1" flipV="1">
-            <a:off x="5508700" y="2453706"/>
-            <a:ext cx="1357745" cy="854842"/>
-          </a:xfrm>
-          <a:prstGeom prst="straightConnector1">
-            <a:avLst/>
-          </a:prstGeom>
-          <a:ln>
-            <a:tailEnd type="triangle"/>
-          </a:ln>
-        </p:spPr>
-        <p:style>
-          <a:lnRef idx="3">
-            <a:schemeClr val="dk1"/>
-          </a:lnRef>
-          <a:fillRef idx="0">
-            <a:schemeClr val="dk1"/>
-          </a:fillRef>
-          <a:effectRef idx="2">
-            <a:schemeClr val="dk1"/>
-          </a:effectRef>
-          <a:fontRef idx="minor">
-            <a:schemeClr val="tx1"/>
-          </a:fontRef>
-        </p:style>
-      </p:cxnSp>
-      <p:cxnSp>
-        <p:nvCxnSpPr>
-          <p:cNvPr id="12" name="Elbow Connector 37"/>
-          <p:cNvCxnSpPr/>
-          <p:nvPr/>
-        </p:nvCxnSpPr>
-        <p:spPr>
-          <a:xfrm flipH="1">
-            <a:off x="5416479" y="4042275"/>
-            <a:ext cx="1976439" cy="720521"/>
+          <a:xfrm flipV="1">
+            <a:off x="3090441" y="2731625"/>
+            <a:ext cx="671688" cy="648185"/>
           </a:xfrm>
           <a:prstGeom prst="straightConnector1">
             <a:avLst/>
@@ -6567,9 +6521,9 @@
           <p:nvPr/>
         </p:nvCxnSpPr>
         <p:spPr>
-          <a:xfrm>
-            <a:off x="3416302" y="3856280"/>
-            <a:ext cx="345827" cy="643105"/>
+          <a:xfrm flipH="1" flipV="1">
+            <a:off x="3504430" y="4074289"/>
+            <a:ext cx="397143" cy="694482"/>
           </a:xfrm>
           <a:prstGeom prst="straightConnector1">
             <a:avLst/>
@@ -6596,15 +6550,13 @@
       <p:cxnSp>
         <p:nvCxnSpPr>
           <p:cNvPr id="15" name="Elbow Connector 37"/>
-          <p:cNvCxnSpPr>
-            <a:stCxn id="5" idx="3"/>
-          </p:cNvCxnSpPr>
+          <p:cNvCxnSpPr/>
           <p:nvPr/>
         </p:nvCxnSpPr>
         <p:spPr>
-          <a:xfrm>
-            <a:off x="3539902" y="3598101"/>
-            <a:ext cx="731559" cy="14126"/>
+          <a:xfrm flipH="1">
+            <a:off x="3762129" y="3612227"/>
+            <a:ext cx="856170" cy="0"/>
           </a:xfrm>
           <a:prstGeom prst="straightConnector1">
             <a:avLst/>
@@ -6670,9 +6622,9 @@
           <p:nvPr/>
         </p:nvCxnSpPr>
         <p:spPr>
-          <a:xfrm>
-            <a:off x="3948354" y="2624861"/>
-            <a:ext cx="2349" cy="1843370"/>
+          <a:xfrm flipH="1" flipV="1">
+            <a:off x="4163305" y="2859120"/>
+            <a:ext cx="26910" cy="1909652"/>
           </a:xfrm>
           <a:prstGeom prst="straightConnector1">
             <a:avLst/>
@@ -7299,22 +7251,61 @@
           </a:p>
         </p:txBody>
       </p:sp>
-      <p:sp>
-        <p:nvSpPr>
-          <p:cNvPr id="34" name="Rounded Rectangle 36"/>
+      <p:cxnSp>
+        <p:nvCxnSpPr>
+          <p:cNvPr id="71" name="Elbow Connector 37"/>
+          <p:cNvCxnSpPr/>
+          <p:nvPr/>
+        </p:nvCxnSpPr>
+        <p:spPr>
+          <a:xfrm>
+            <a:off x="5771920" y="3884798"/>
+            <a:ext cx="537108" cy="583433"/>
+          </a:xfrm>
+          <a:prstGeom prst="straightConnector1">
+            <a:avLst/>
+          </a:prstGeom>
+          <a:ln w="19050" cap="flat" cmpd="sng" algn="ctr">
+            <a:solidFill>
+              <a:schemeClr val="accent1"/>
+            </a:solidFill>
+            <a:prstDash val="dash"/>
+            <a:round/>
+            <a:headEnd type="none" w="med" len="med"/>
+            <a:tailEnd type="triangle" w="med" len="med"/>
+          </a:ln>
+        </p:spPr>
+        <p:style>
+          <a:lnRef idx="0">
+            <a:scrgbClr r="0" g="0" b="0"/>
+          </a:lnRef>
+          <a:fillRef idx="0">
+            <a:scrgbClr r="0" g="0" b="0"/>
+          </a:fillRef>
+          <a:effectRef idx="0">
+            <a:scrgbClr r="0" g="0" b="0"/>
+          </a:effectRef>
+          <a:fontRef idx="minor">
+            <a:schemeClr val="tx1"/>
+          </a:fontRef>
+        </p:style>
+      </p:cxnSp>
+      <p:sp>
+        <p:nvSpPr>
+          <p:cNvPr id="8" name="Rounded Rectangle 9"/>
           <p:cNvSpPr/>
           <p:nvPr/>
         </p:nvSpPr>
         <p:spPr>
           <a:xfrm>
-            <a:off x="7253084" y="3682138"/>
-            <a:ext cx="909353" cy="405321"/>
+            <a:off x="4449999" y="3233853"/>
+            <a:ext cx="1468649" cy="728495"/>
           </a:xfrm>
           <a:prstGeom prst="roundRect">
             <a:avLst/>
           </a:prstGeom>
           <a:solidFill>
-            <a:srgbClr val="71A7D9"/>
+            <a:srgbClr val="CEE1F2"/>
           </a:solidFill>
           <a:ln cap="rnd">
             <a:round/>
@@ -7354,92 +7345,13 @@
                   <a:schemeClr val="tx1"/>
                 </a:solidFill>
               </a:rPr>
-              <a:t>Role</a:t>
-            </a:r>
-          </a:p>
-        </p:txBody>
-      </p:sp>
-      <p:cxnSp>
-        <p:nvCxnSpPr>
-          <p:cNvPr id="71" name="Elbow Connector 37"/>
-          <p:cNvCxnSpPr/>
-          <p:nvPr/>
-        </p:nvCxnSpPr>
-        <p:spPr>
-          <a:xfrm>
-            <a:off x="5771920" y="3884798"/>
-            <a:ext cx="415652" cy="463854"/>
-          </a:xfrm>
-          <a:prstGeom prst="straightConnector1">
-            <a:avLst/>
-          </a:prstGeom>
-          <a:ln>
-            <a:tailEnd type="triangle"/>
-          </a:ln>
-        </p:spPr>
-        <p:style>
-          <a:lnRef idx="3">
-            <a:schemeClr val="dk1"/>
-          </a:lnRef>
-          <a:fillRef idx="0">
-            <a:schemeClr val="dk1"/>
-          </a:fillRef>
-          <a:effectRef idx="2">
-            <a:schemeClr val="dk1"/>
-          </a:effectRef>
-          <a:fontRef idx="minor">
-            <a:schemeClr val="tx1"/>
-          </a:fontRef>
-        </p:style>
-      </p:cxnSp>
-      <p:sp>
-        <p:nvSpPr>
-          <p:cNvPr id="8" name="Rounded Rectangle 9"/>
-          <p:cNvSpPr/>
-          <p:nvPr/>
-        </p:nvSpPr>
-        <p:spPr>
-          <a:xfrm>
-            <a:off x="4449999" y="3233853"/>
-            <a:ext cx="1468649" cy="728495"/>
-          </a:xfrm>
-          <a:prstGeom prst="roundRect">
-            <a:avLst/>
-          </a:prstGeom>
-          <a:solidFill>
-            <a:schemeClr val="accent5">
-              <a:lumMod val="60000"/>
-              <a:lumOff val="40000"/>
-            </a:schemeClr>
-          </a:solidFill>
-          <a:ln>
-            <a:noFill/>
-          </a:ln>
-        </p:spPr>
-        <p:style>
-          <a:lnRef idx="0">
-            <a:scrgbClr r="0" g="0" b="0"/>
-          </a:lnRef>
-          <a:fillRef idx="0">
-            <a:scrgbClr r="0" g="0" b="0"/>
-          </a:fillRef>
-          <a:effectRef idx="0">
-            <a:scrgbClr r="0" g="0" b="0"/>
-          </a:effectRef>
-          <a:fontRef idx="minor">
-            <a:schemeClr val="lt1"/>
-          </a:fontRef>
-        </p:style>
-        <p:txBody>
-          <a:bodyPr rtlCol="0" anchor="ctr"/>
-          <a:lstStyle/>
-          <a:p>
-            <a:pPr algn="ctr"/>
-            <a:r>
-              <a:rPr lang="en-US" sz="1600" dirty="0"/>
               <a:t>Practitioner Role</a:t>
             </a:r>
-            <a:endParaRPr lang="en-AU" sz="1600" dirty="0"/>
+            <a:endParaRPr lang="en-AU" dirty="0">
+              <a:solidFill>
+                <a:schemeClr val="tx1"/>
+              </a:solidFill>
+            </a:endParaRPr>
           </a:p>
         </p:txBody>
       </p:sp>

</xml_diff>

<commit_message>
#FHIR-22687 Update resource description to cater for healthcareservce catalogs
</commit_message>
<xml_diff>
--- a/images/source/administration-module-resources.pptx
+++ b/images/source/administration-module-resources.pptx
@@ -251,7 +251,7 @@
           <a:p>
             <a:fld id="{DE4E7392-00FF-4A5B-A4FB-CA939482D6BD}" type="datetimeFigureOut">
               <a:rPr lang="en-US" smtClean="0"/>
-              <a:t>3/20/2017</a:t>
+              <a:t>8/8/2022</a:t>
             </a:fld>
             <a:endParaRPr lang="en-US"/>
           </a:p>
@@ -419,7 +419,7 @@
           <a:p>
             <a:fld id="{DE4E7392-00FF-4A5B-A4FB-CA939482D6BD}" type="datetimeFigureOut">
               <a:rPr lang="en-US" smtClean="0"/>
-              <a:t>3/20/2017</a:t>
+              <a:t>8/8/2022</a:t>
             </a:fld>
             <a:endParaRPr lang="en-US"/>
           </a:p>
@@ -597,7 +597,7 @@
           <a:p>
             <a:fld id="{DE4E7392-00FF-4A5B-A4FB-CA939482D6BD}" type="datetimeFigureOut">
               <a:rPr lang="en-US" smtClean="0"/>
-              <a:t>3/20/2017</a:t>
+              <a:t>8/8/2022</a:t>
             </a:fld>
             <a:endParaRPr lang="en-US"/>
           </a:p>
@@ -765,7 +765,7 @@
           <a:p>
             <a:fld id="{DE4E7392-00FF-4A5B-A4FB-CA939482D6BD}" type="datetimeFigureOut">
               <a:rPr lang="en-US" smtClean="0"/>
-              <a:t>3/20/2017</a:t>
+              <a:t>8/8/2022</a:t>
             </a:fld>
             <a:endParaRPr lang="en-US"/>
           </a:p>
@@ -1010,7 +1010,7 @@
           <a:p>
             <a:fld id="{DE4E7392-00FF-4A5B-A4FB-CA939482D6BD}" type="datetimeFigureOut">
               <a:rPr lang="en-US" smtClean="0"/>
-              <a:t>3/20/2017</a:t>
+              <a:t>8/8/2022</a:t>
             </a:fld>
             <a:endParaRPr lang="en-US"/>
           </a:p>
@@ -1239,7 +1239,7 @@
           <a:p>
             <a:fld id="{DE4E7392-00FF-4A5B-A4FB-CA939482D6BD}" type="datetimeFigureOut">
               <a:rPr lang="en-US" smtClean="0"/>
-              <a:t>3/20/2017</a:t>
+              <a:t>8/8/2022</a:t>
             </a:fld>
             <a:endParaRPr lang="en-US"/>
           </a:p>
@@ -1603,7 +1603,7 @@
           <a:p>
             <a:fld id="{DE4E7392-00FF-4A5B-A4FB-CA939482D6BD}" type="datetimeFigureOut">
               <a:rPr lang="en-US" smtClean="0"/>
-              <a:t>3/20/2017</a:t>
+              <a:t>8/8/2022</a:t>
             </a:fld>
             <a:endParaRPr lang="en-US"/>
           </a:p>
@@ -1720,7 +1720,7 @@
           <a:p>
             <a:fld id="{DE4E7392-00FF-4A5B-A4FB-CA939482D6BD}" type="datetimeFigureOut">
               <a:rPr lang="en-US" smtClean="0"/>
-              <a:t>3/20/2017</a:t>
+              <a:t>8/8/2022</a:t>
             </a:fld>
             <a:endParaRPr lang="en-US"/>
           </a:p>
@@ -1815,7 +1815,7 @@
           <a:p>
             <a:fld id="{DE4E7392-00FF-4A5B-A4FB-CA939482D6BD}" type="datetimeFigureOut">
               <a:rPr lang="en-US" smtClean="0"/>
-              <a:t>3/20/2017</a:t>
+              <a:t>8/8/2022</a:t>
             </a:fld>
             <a:endParaRPr lang="en-US"/>
           </a:p>
@@ -2090,7 +2090,7 @@
           <a:p>
             <a:fld id="{DE4E7392-00FF-4A5B-A4FB-CA939482D6BD}" type="datetimeFigureOut">
               <a:rPr lang="en-US" smtClean="0"/>
-              <a:t>3/20/2017</a:t>
+              <a:t>8/8/2022</a:t>
             </a:fld>
             <a:endParaRPr lang="en-US"/>
           </a:p>
@@ -2342,7 +2342,7 @@
           <a:p>
             <a:fld id="{DE4E7392-00FF-4A5B-A4FB-CA939482D6BD}" type="datetimeFigureOut">
               <a:rPr lang="en-US" smtClean="0"/>
-              <a:t>3/20/2017</a:t>
+              <a:t>8/8/2022</a:t>
             </a:fld>
             <a:endParaRPr lang="en-US"/>
           </a:p>
@@ -2553,7 +2553,7 @@
           <a:p>
             <a:fld id="{DE4E7392-00FF-4A5B-A4FB-CA939482D6BD}" type="datetimeFigureOut">
               <a:rPr lang="en-US" smtClean="0"/>
-              <a:t>3/20/2017</a:t>
+              <a:t>8/8/2022</a:t>
             </a:fld>
             <a:endParaRPr lang="en-US"/>
           </a:p>
@@ -7377,6 +7377,88 @@
           </a:p>
         </p:txBody>
       </p:sp>
+      <p:cxnSp>
+        <p:nvCxnSpPr>
+          <p:cNvPr id="26" name="Connector: Curved 25">
+            <a:extLst>
+              <a:ext uri="{FF2B5EF4-FFF2-40B4-BE49-F238E27FC236}">
+                <a16:creationId xmlns:a16="http://schemas.microsoft.com/office/drawing/2014/main" id="{FEB1B621-35B1-6D4A-4491-C8CA35F1AF3C}"/>
+              </a:ext>
+            </a:extLst>
+          </p:cNvPr>
+          <p:cNvCxnSpPr>
+            <a:cxnSpLocks/>
+            <a:stCxn id="7" idx="2"/>
+            <a:endCxn id="7" idx="1"/>
+          </p:cNvCxnSpPr>
+          <p:nvPr/>
+        </p:nvCxnSpPr>
+        <p:spPr>
+          <a:xfrm rot="5400000" flipH="1">
+            <a:off x="3951201" y="4789077"/>
+            <a:ext cx="364247" cy="734325"/>
+          </a:xfrm>
+          <a:prstGeom prst="curvedConnector4">
+            <a:avLst>
+              <a:gd name="adj1" fmla="val -62760"/>
+              <a:gd name="adj2" fmla="val 131131"/>
+            </a:avLst>
+          </a:prstGeom>
+          <a:ln>
+            <a:tailEnd type="triangle"/>
+          </a:ln>
+        </p:spPr>
+        <p:style>
+          <a:lnRef idx="3">
+            <a:schemeClr val="dk1"/>
+          </a:lnRef>
+          <a:fillRef idx="0">
+            <a:schemeClr val="dk1"/>
+          </a:fillRef>
+          <a:effectRef idx="2">
+            <a:schemeClr val="dk1"/>
+          </a:effectRef>
+          <a:fontRef idx="minor">
+            <a:schemeClr val="tx1"/>
+          </a:fontRef>
+        </p:style>
+      </p:cxnSp>
+      <p:sp>
+        <p:nvSpPr>
+          <p:cNvPr id="27" name="TextBox 26">
+            <a:extLst>
+              <a:ext uri="{FF2B5EF4-FFF2-40B4-BE49-F238E27FC236}">
+                <a16:creationId xmlns:a16="http://schemas.microsoft.com/office/drawing/2014/main" id="{6C57655D-6292-A296-0740-B12D54025239}"/>
+              </a:ext>
+            </a:extLst>
+          </p:cNvPr>
+          <p:cNvSpPr txBox="1"/>
+          <p:nvPr/>
+        </p:nvSpPr>
+        <p:spPr>
+          <a:xfrm>
+            <a:off x="2614285" y="5084330"/>
+            <a:ext cx="952312" cy="338554"/>
+          </a:xfrm>
+          <a:prstGeom prst="rect">
+            <a:avLst/>
+          </a:prstGeom>
+          <a:noFill/>
+        </p:spPr>
+        <p:txBody>
+          <a:bodyPr wrap="none" rtlCol="0">
+            <a:spAutoFit/>
+          </a:bodyPr>
+          <a:lstStyle/>
+          <a:p>
+            <a:r>
+              <a:rPr lang="en-US" sz="1600" dirty="0" err="1"/>
+              <a:t>offeredIn</a:t>
+            </a:r>
+            <a:endParaRPr lang="en-US" sz="1600" dirty="0"/>
+          </a:p>
+        </p:txBody>
+      </p:sp>
     </p:spTree>
     <p:extLst>
       <p:ext uri="{BB962C8B-B14F-4D97-AF65-F5344CB8AC3E}">
@@ -11815,7 +11897,7 @@
         <p:spPr>
           <a:xfrm>
             <a:off x="1615905" y="1253613"/>
-            <a:ext cx="5527107" cy="2082959"/>
+            <a:ext cx="6323340" cy="2082959"/>
           </a:xfrm>
           <a:prstGeom prst="roundRect">
             <a:avLst>
@@ -12251,14 +12333,6 @@
               <a:t>Practitioner</a:t>
             </a:r>
           </a:p>
-          <a:p>
-            <a:pPr algn="ctr"/>
-            <a:endParaRPr lang="en-AU" dirty="0">
-              <a:solidFill>
-                <a:schemeClr val="tx1"/>
-              </a:solidFill>
-            </a:endParaRPr>
-          </a:p>
         </p:txBody>
       </p:sp>
       <p:sp>
@@ -13240,6 +13314,88 @@
               </a:rPr>
               <a:t>Role</a:t>
             </a:r>
+          </a:p>
+        </p:txBody>
+      </p:sp>
+      <p:cxnSp>
+        <p:nvCxnSpPr>
+          <p:cNvPr id="4" name="Connector: Curved 3">
+            <a:extLst>
+              <a:ext uri="{FF2B5EF4-FFF2-40B4-BE49-F238E27FC236}">
+                <a16:creationId xmlns:a16="http://schemas.microsoft.com/office/drawing/2014/main" id="{07CA15BD-489B-E6AE-D0A9-5085A86CC09C}"/>
+              </a:ext>
+            </a:extLst>
+          </p:cNvPr>
+          <p:cNvCxnSpPr>
+            <a:cxnSpLocks/>
+            <a:stCxn id="18" idx="3"/>
+            <a:endCxn id="18" idx="0"/>
+          </p:cNvCxnSpPr>
+          <p:nvPr/>
+        </p:nvCxnSpPr>
+        <p:spPr>
+          <a:xfrm flipH="1" flipV="1">
+            <a:off x="6020245" y="1507553"/>
+            <a:ext cx="734324" cy="364248"/>
+          </a:xfrm>
+          <a:prstGeom prst="curvedConnector4">
+            <a:avLst>
+              <a:gd name="adj1" fmla="val -23458"/>
+              <a:gd name="adj2" fmla="val 146102"/>
+            </a:avLst>
+          </a:prstGeom>
+          <a:ln>
+            <a:tailEnd type="triangle"/>
+          </a:ln>
+        </p:spPr>
+        <p:style>
+          <a:lnRef idx="3">
+            <a:schemeClr val="dk1"/>
+          </a:lnRef>
+          <a:fillRef idx="0">
+            <a:schemeClr val="dk1"/>
+          </a:fillRef>
+          <a:effectRef idx="2">
+            <a:schemeClr val="dk1"/>
+          </a:effectRef>
+          <a:fontRef idx="minor">
+            <a:schemeClr val="tx1"/>
+          </a:fontRef>
+        </p:style>
+      </p:cxnSp>
+      <p:sp>
+        <p:nvSpPr>
+          <p:cNvPr id="38" name="TextBox 37">
+            <a:extLst>
+              <a:ext uri="{FF2B5EF4-FFF2-40B4-BE49-F238E27FC236}">
+                <a16:creationId xmlns:a16="http://schemas.microsoft.com/office/drawing/2014/main" id="{987B85B0-0E88-909A-6D39-9356A12C5721}"/>
+              </a:ext>
+            </a:extLst>
+          </p:cNvPr>
+          <p:cNvSpPr txBox="1"/>
+          <p:nvPr/>
+        </p:nvSpPr>
+        <p:spPr>
+          <a:xfrm>
+            <a:off x="6925025" y="1396804"/>
+            <a:ext cx="952312" cy="338554"/>
+          </a:xfrm>
+          <a:prstGeom prst="rect">
+            <a:avLst/>
+          </a:prstGeom>
+          <a:noFill/>
+        </p:spPr>
+        <p:txBody>
+          <a:bodyPr wrap="none" rtlCol="0">
+            <a:spAutoFit/>
+          </a:bodyPr>
+          <a:lstStyle/>
+          <a:p>
+            <a:r>
+              <a:rPr lang="en-US" sz="1600" dirty="0" err="1"/>
+              <a:t>offeredIn</a:t>
+            </a:r>
+            <a:endParaRPr lang="en-US" sz="1600" dirty="0"/>
           </a:p>
         </p:txBody>
       </p:sp>

</xml_diff>

<commit_message>
#FHIR-25932 Admin Module diagram updates
</commit_message>
<xml_diff>
--- a/images/source/administration-module-resources.pptx
+++ b/images/source/administration-module-resources.pptx
@@ -6298,9 +6298,312 @@
           <a:chExt cx="0" cy="0"/>
         </a:xfrm>
       </p:grpSpPr>
+      <p:sp>
+        <p:nvSpPr>
+          <p:cNvPr id="18" name="Rounded Rectangle 19"/>
+          <p:cNvSpPr/>
+          <p:nvPr/>
+        </p:nvSpPr>
+        <p:spPr>
+          <a:xfrm>
+            <a:off x="2747773" y="5879813"/>
+            <a:ext cx="1468649" cy="728495"/>
+          </a:xfrm>
+          <a:prstGeom prst="roundRect">
+            <a:avLst/>
+          </a:prstGeom>
+        </p:spPr>
+        <p:style>
+          <a:lnRef idx="0">
+            <a:schemeClr val="accent3"/>
+          </a:lnRef>
+          <a:fillRef idx="3">
+            <a:schemeClr val="accent3"/>
+          </a:fillRef>
+          <a:effectRef idx="3">
+            <a:schemeClr val="accent3"/>
+          </a:effectRef>
+          <a:fontRef idx="minor">
+            <a:schemeClr val="lt1"/>
+          </a:fontRef>
+        </p:style>
+        <p:txBody>
+          <a:bodyPr rtlCol="0" anchor="ctr"/>
+          <a:lstStyle/>
+          <a:p>
+            <a:pPr algn="ctr"/>
+            <a:r>
+              <a:rPr lang="en-US" sz="1600" dirty="0"/>
+              <a:t>Schedule</a:t>
+            </a:r>
+            <a:endParaRPr lang="en-AU" sz="1600" dirty="0"/>
+          </a:p>
+        </p:txBody>
+      </p:sp>
+      <p:sp>
+        <p:nvSpPr>
+          <p:cNvPr id="19" name="Rounded Rectangle 20"/>
+          <p:cNvSpPr/>
+          <p:nvPr/>
+        </p:nvSpPr>
+        <p:spPr>
+          <a:xfrm>
+            <a:off x="4436636" y="5879813"/>
+            <a:ext cx="1468649" cy="728495"/>
+          </a:xfrm>
+          <a:prstGeom prst="roundRect">
+            <a:avLst/>
+          </a:prstGeom>
+        </p:spPr>
+        <p:style>
+          <a:lnRef idx="0">
+            <a:schemeClr val="accent3"/>
+          </a:lnRef>
+          <a:fillRef idx="3">
+            <a:schemeClr val="accent3"/>
+          </a:fillRef>
+          <a:effectRef idx="3">
+            <a:schemeClr val="accent3"/>
+          </a:effectRef>
+          <a:fontRef idx="minor">
+            <a:schemeClr val="lt1"/>
+          </a:fontRef>
+        </p:style>
+        <p:txBody>
+          <a:bodyPr rtlCol="0" anchor="ctr"/>
+          <a:lstStyle/>
+          <a:p>
+            <a:pPr algn="ctr"/>
+            <a:r>
+              <a:rPr lang="en-US" sz="1600" dirty="0"/>
+              <a:t>Referral Request</a:t>
+            </a:r>
+            <a:endParaRPr lang="en-AU" sz="1600" dirty="0"/>
+          </a:p>
+        </p:txBody>
+      </p:sp>
+      <p:sp>
+        <p:nvSpPr>
+          <p:cNvPr id="20" name="Rounded Rectangle 21"/>
+          <p:cNvSpPr/>
+          <p:nvPr/>
+        </p:nvSpPr>
+        <p:spPr>
+          <a:xfrm>
+            <a:off x="6125499" y="5879813"/>
+            <a:ext cx="1468649" cy="728495"/>
+          </a:xfrm>
+          <a:prstGeom prst="roundRect">
+            <a:avLst/>
+          </a:prstGeom>
+          <a:solidFill>
+            <a:schemeClr val="accent3">
+              <a:alpha val="50000"/>
+            </a:schemeClr>
+          </a:solidFill>
+          <a:ln>
+            <a:noFill/>
+          </a:ln>
+        </p:spPr>
+        <p:style>
+          <a:lnRef idx="0">
+            <a:scrgbClr r="0" g="0" b="0"/>
+          </a:lnRef>
+          <a:fillRef idx="0">
+            <a:scrgbClr r="0" g="0" b="0"/>
+          </a:fillRef>
+          <a:effectRef idx="0">
+            <a:scrgbClr r="0" g="0" b="0"/>
+          </a:effectRef>
+          <a:fontRef idx="minor">
+            <a:schemeClr val="lt1"/>
+          </a:fontRef>
+        </p:style>
+        <p:txBody>
+          <a:bodyPr rtlCol="0" anchor="ctr"/>
+          <a:lstStyle/>
+          <a:p>
+            <a:pPr algn="ctr"/>
+            <a:r>
+              <a:rPr lang="en-US" sz="1600" dirty="0"/>
+              <a:t>Care Plan</a:t>
+            </a:r>
+            <a:endParaRPr lang="en-AU" sz="1600" dirty="0"/>
+          </a:p>
+        </p:txBody>
+      </p:sp>
+      <p:sp>
+        <p:nvSpPr>
+          <p:cNvPr id="22" name="Rounded Rectangle 23"/>
+          <p:cNvSpPr/>
+          <p:nvPr/>
+        </p:nvSpPr>
+        <p:spPr>
+          <a:xfrm>
+            <a:off x="7814362" y="5879813"/>
+            <a:ext cx="1468649" cy="728495"/>
+          </a:xfrm>
+          <a:prstGeom prst="roundRect">
+            <a:avLst/>
+          </a:prstGeom>
+          <a:solidFill>
+            <a:schemeClr val="accent3">
+              <a:alpha val="50000"/>
+            </a:schemeClr>
+          </a:solidFill>
+          <a:ln>
+            <a:noFill/>
+          </a:ln>
+        </p:spPr>
+        <p:style>
+          <a:lnRef idx="0">
+            <a:scrgbClr r="0" g="0" b="0"/>
+          </a:lnRef>
+          <a:fillRef idx="0">
+            <a:scrgbClr r="0" g="0" b="0"/>
+          </a:fillRef>
+          <a:effectRef idx="0">
+            <a:scrgbClr r="0" g="0" b="0"/>
+          </a:effectRef>
+          <a:fontRef idx="minor">
+            <a:schemeClr val="lt1"/>
+          </a:fontRef>
+        </p:style>
+        <p:txBody>
+          <a:bodyPr lIns="36000" rIns="36000" rtlCol="0" anchor="ctr"/>
+          <a:lstStyle/>
+          <a:p>
+            <a:pPr algn="ctr"/>
+            <a:r>
+              <a:rPr lang="en-US" sz="1600" dirty="0"/>
+              <a:t>Questionnaire</a:t>
+            </a:r>
+            <a:endParaRPr lang="en-AU" sz="1600" dirty="0"/>
+          </a:p>
+        </p:txBody>
+      </p:sp>
+      <p:sp>
+        <p:nvSpPr>
+          <p:cNvPr id="23" name="Rounded Rectangle 24"/>
+          <p:cNvSpPr/>
+          <p:nvPr/>
+        </p:nvSpPr>
+        <p:spPr>
+          <a:xfrm>
+            <a:off x="9503227" y="5879813"/>
+            <a:ext cx="1468649" cy="728495"/>
+          </a:xfrm>
+          <a:prstGeom prst="roundRect">
+            <a:avLst/>
+          </a:prstGeom>
+          <a:solidFill>
+            <a:schemeClr val="accent3">
+              <a:alpha val="50000"/>
+            </a:schemeClr>
+          </a:solidFill>
+          <a:ln>
+            <a:noFill/>
+          </a:ln>
+        </p:spPr>
+        <p:style>
+          <a:lnRef idx="0">
+            <a:scrgbClr r="0" g="0" b="0"/>
+          </a:lnRef>
+          <a:fillRef idx="0">
+            <a:scrgbClr r="0" g="0" b="0"/>
+          </a:fillRef>
+          <a:effectRef idx="0">
+            <a:scrgbClr r="0" g="0" b="0"/>
+          </a:effectRef>
+          <a:fontRef idx="minor">
+            <a:schemeClr val="lt1"/>
+          </a:fontRef>
+        </p:style>
+        <p:txBody>
+          <a:bodyPr rtlCol="0" anchor="ctr"/>
+          <a:lstStyle/>
+          <a:p>
+            <a:r>
+              <a:rPr lang="en-US" sz="1600" dirty="0"/>
+              <a:t>…</a:t>
+            </a:r>
+            <a:endParaRPr lang="en-AU" sz="1600" dirty="0"/>
+          </a:p>
+        </p:txBody>
+      </p:sp>
+      <p:sp>
+        <p:nvSpPr>
+          <p:cNvPr id="24" name="Rounded Rectangle 26"/>
+          <p:cNvSpPr/>
+          <p:nvPr/>
+        </p:nvSpPr>
+        <p:spPr>
+          <a:xfrm>
+            <a:off x="1058910" y="5879813"/>
+            <a:ext cx="1468649" cy="728495"/>
+          </a:xfrm>
+          <a:prstGeom prst="roundRect">
+            <a:avLst/>
+          </a:prstGeom>
+        </p:spPr>
+        <p:style>
+          <a:lnRef idx="0">
+            <a:schemeClr val="accent3"/>
+          </a:lnRef>
+          <a:fillRef idx="3">
+            <a:schemeClr val="accent3"/>
+          </a:fillRef>
+          <a:effectRef idx="3">
+            <a:schemeClr val="accent3"/>
+          </a:effectRef>
+          <a:fontRef idx="minor">
+            <a:schemeClr val="lt1"/>
+          </a:fontRef>
+        </p:style>
+        <p:txBody>
+          <a:bodyPr rtlCol="0" anchor="ctr"/>
+          <a:lstStyle/>
+          <a:p>
+            <a:pPr algn="ctr"/>
+            <a:r>
+              <a:rPr lang="en-US" sz="1600" dirty="0"/>
+              <a:t>Document Reference</a:t>
+            </a:r>
+            <a:endParaRPr lang="en-AU" sz="1600" dirty="0"/>
+          </a:p>
+        </p:txBody>
+      </p:sp>
+      <p:sp>
+        <p:nvSpPr>
+          <p:cNvPr id="2" name="Title 1"/>
+          <p:cNvSpPr>
+            <a:spLocks noGrp="1"/>
+          </p:cNvSpPr>
+          <p:nvPr>
+            <p:ph type="title"/>
+          </p:nvPr>
+        </p:nvSpPr>
+        <p:spPr/>
+        <p:txBody>
+          <a:bodyPr/>
+          <a:lstStyle/>
+          <a:p>
+            <a:r>
+              <a:rPr lang="en-AU" dirty="0"/>
+              <a:t>Directories</a:t>
+            </a:r>
+          </a:p>
+        </p:txBody>
+      </p:sp>
       <p:cxnSp>
         <p:nvCxnSpPr>
-          <p:cNvPr id="74" name="Elbow Connector 37"/>
+          <p:cNvPr id="28" name="Elbow Connector 37">
+            <a:extLst>
+              <a:ext uri="{FF2B5EF4-FFF2-40B4-BE49-F238E27FC236}">
+                <a16:creationId xmlns:a16="http://schemas.microsoft.com/office/drawing/2014/main" id="{4FF12D77-31B3-2765-34AB-FAAB84585AF5}"/>
+              </a:ext>
+            </a:extLst>
+          </p:cNvPr>
           <p:cNvCxnSpPr/>
           <p:nvPr/>
         </p:nvCxnSpPr>
@@ -6339,14 +6642,22 @@
       </p:cxnSp>
       <p:cxnSp>
         <p:nvCxnSpPr>
-          <p:cNvPr id="80" name="Elbow Connector 37"/>
-          <p:cNvCxnSpPr/>
+          <p:cNvPr id="29" name="Elbow Connector 37">
+            <a:extLst>
+              <a:ext uri="{FF2B5EF4-FFF2-40B4-BE49-F238E27FC236}">
+                <a16:creationId xmlns:a16="http://schemas.microsoft.com/office/drawing/2014/main" id="{946FC6D4-03E7-26C5-AC79-D347A4C49875}"/>
+              </a:ext>
+            </a:extLst>
+          </p:cNvPr>
+          <p:cNvCxnSpPr>
+            <a:cxnSpLocks/>
+          </p:cNvCxnSpPr>
           <p:nvPr/>
         </p:nvCxnSpPr>
         <p:spPr>
           <a:xfrm>
-            <a:off x="3504430" y="3767012"/>
-            <a:ext cx="2683142" cy="945145"/>
+            <a:off x="2747773" y="3691427"/>
+            <a:ext cx="3439799" cy="1020730"/>
           </a:xfrm>
           <a:prstGeom prst="straightConnector1">
             <a:avLst/>
@@ -6378,7 +6689,13 @@
       </p:cxnSp>
       <p:cxnSp>
         <p:nvCxnSpPr>
-          <p:cNvPr id="76" name="Elbow Connector 37"/>
+          <p:cNvPr id="30" name="Elbow Connector 37">
+            <a:extLst>
+              <a:ext uri="{FF2B5EF4-FFF2-40B4-BE49-F238E27FC236}">
+                <a16:creationId xmlns:a16="http://schemas.microsoft.com/office/drawing/2014/main" id="{8F367B5D-4C70-F234-D008-92B3C4FC5125}"/>
+              </a:ext>
+            </a:extLst>
+          </p:cNvPr>
           <p:cNvCxnSpPr/>
           <p:nvPr/>
         </p:nvCxnSpPr>
@@ -6417,7 +6734,13 @@
       </p:cxnSp>
       <p:cxnSp>
         <p:nvCxnSpPr>
-          <p:cNvPr id="9" name="Elbow Connector 37"/>
+          <p:cNvPr id="31" name="Elbow Connector 37">
+            <a:extLst>
+              <a:ext uri="{FF2B5EF4-FFF2-40B4-BE49-F238E27FC236}">
+                <a16:creationId xmlns:a16="http://schemas.microsoft.com/office/drawing/2014/main" id="{8AB67462-E28B-9EE3-C93F-2C4083FABDFF}"/>
+              </a:ext>
+            </a:extLst>
+          </p:cNvPr>
           <p:cNvCxnSpPr/>
           <p:nvPr/>
         </p:nvCxnSpPr>
@@ -6450,14 +6773,22 @@
       </p:cxnSp>
       <p:cxnSp>
         <p:nvCxnSpPr>
-          <p:cNvPr id="10" name="Elbow Connector 37"/>
-          <p:cNvCxnSpPr/>
+          <p:cNvPr id="32" name="Elbow Connector 37">
+            <a:extLst>
+              <a:ext uri="{FF2B5EF4-FFF2-40B4-BE49-F238E27FC236}">
+                <a16:creationId xmlns:a16="http://schemas.microsoft.com/office/drawing/2014/main" id="{7B2E25D0-8371-3C11-0714-71AFDC522782}"/>
+              </a:ext>
+            </a:extLst>
+          </p:cNvPr>
+          <p:cNvCxnSpPr>
+            <a:cxnSpLocks/>
+          </p:cNvCxnSpPr>
           <p:nvPr/>
         </p:nvCxnSpPr>
         <p:spPr>
           <a:xfrm flipV="1">
-            <a:off x="3090441" y="2731625"/>
-            <a:ext cx="671688" cy="648185"/>
+            <a:off x="2730159" y="2731625"/>
+            <a:ext cx="1031970" cy="602425"/>
           </a:xfrm>
           <a:prstGeom prst="straightConnector1">
             <a:avLst/>
@@ -6483,7 +6814,13 @@
       </p:cxnSp>
       <p:cxnSp>
         <p:nvCxnSpPr>
-          <p:cNvPr id="13" name="Elbow Connector 37"/>
+          <p:cNvPr id="33" name="Elbow Connector 37">
+            <a:extLst>
+              <a:ext uri="{FF2B5EF4-FFF2-40B4-BE49-F238E27FC236}">
+                <a16:creationId xmlns:a16="http://schemas.microsoft.com/office/drawing/2014/main" id="{A4192A0E-0286-F7A8-1985-E98E33BA9BF9}"/>
+              </a:ext>
+            </a:extLst>
+          </p:cNvPr>
           <p:cNvCxnSpPr/>
           <p:nvPr/>
         </p:nvCxnSpPr>
@@ -6516,14 +6853,22 @@
       </p:cxnSp>
       <p:cxnSp>
         <p:nvCxnSpPr>
-          <p:cNvPr id="14" name="Elbow Connector 37"/>
-          <p:cNvCxnSpPr/>
+          <p:cNvPr id="34" name="Elbow Connector 37">
+            <a:extLst>
+              <a:ext uri="{FF2B5EF4-FFF2-40B4-BE49-F238E27FC236}">
+                <a16:creationId xmlns:a16="http://schemas.microsoft.com/office/drawing/2014/main" id="{1E40B0EE-894B-673B-C418-E8699F79D442}"/>
+              </a:ext>
+            </a:extLst>
+          </p:cNvPr>
+          <p:cNvCxnSpPr>
+            <a:cxnSpLocks/>
+          </p:cNvCxnSpPr>
           <p:nvPr/>
         </p:nvCxnSpPr>
         <p:spPr>
           <a:xfrm flipH="1" flipV="1">
-            <a:off x="3504430" y="4074289"/>
-            <a:ext cx="397143" cy="694482"/>
+            <a:off x="2910163" y="3923844"/>
+            <a:ext cx="1098508" cy="844928"/>
           </a:xfrm>
           <a:prstGeom prst="straightConnector1">
             <a:avLst/>
@@ -6549,14 +6894,22 @@
       </p:cxnSp>
       <p:cxnSp>
         <p:nvCxnSpPr>
-          <p:cNvPr id="15" name="Elbow Connector 37"/>
-          <p:cNvCxnSpPr/>
+          <p:cNvPr id="35" name="Elbow Connector 37">
+            <a:extLst>
+              <a:ext uri="{FF2B5EF4-FFF2-40B4-BE49-F238E27FC236}">
+                <a16:creationId xmlns:a16="http://schemas.microsoft.com/office/drawing/2014/main" id="{881572D5-24EB-05B1-B9C3-0B726970ADC3}"/>
+              </a:ext>
+            </a:extLst>
+          </p:cNvPr>
+          <p:cNvCxnSpPr>
+            <a:cxnSpLocks/>
+          </p:cNvCxnSpPr>
           <p:nvPr/>
         </p:nvCxnSpPr>
         <p:spPr>
-          <a:xfrm flipH="1">
-            <a:off x="3762129" y="3612227"/>
-            <a:ext cx="856170" cy="0"/>
+          <a:xfrm flipH="1" flipV="1">
+            <a:off x="2972657" y="3598008"/>
+            <a:ext cx="1645642" cy="14219"/>
           </a:xfrm>
           <a:prstGeom prst="straightConnector1">
             <a:avLst/>
@@ -6582,9 +6935,15 @@
       </p:cxnSp>
       <p:cxnSp>
         <p:nvCxnSpPr>
-          <p:cNvPr id="16" name="Elbow Connector 37"/>
+          <p:cNvPr id="36" name="Elbow Connector 37">
+            <a:extLst>
+              <a:ext uri="{FF2B5EF4-FFF2-40B4-BE49-F238E27FC236}">
+                <a16:creationId xmlns:a16="http://schemas.microsoft.com/office/drawing/2014/main" id="{27EB1FA2-893E-E646-F916-97D0F0EBC4F6}"/>
+              </a:ext>
+            </a:extLst>
+          </p:cNvPr>
           <p:cNvCxnSpPr>
-            <a:stCxn id="8" idx="3"/>
+            <a:stCxn id="44" idx="3"/>
           </p:cNvCxnSpPr>
           <p:nvPr/>
         </p:nvCxnSpPr>
@@ -6617,13 +6976,19 @@
       </p:cxnSp>
       <p:cxnSp>
         <p:nvCxnSpPr>
-          <p:cNvPr id="17" name="Elbow Connector 37"/>
+          <p:cNvPr id="37" name="Elbow Connector 37">
+            <a:extLst>
+              <a:ext uri="{FF2B5EF4-FFF2-40B4-BE49-F238E27FC236}">
+                <a16:creationId xmlns:a16="http://schemas.microsoft.com/office/drawing/2014/main" id="{B7CBB866-12B9-F1D9-4989-3632396704C1}"/>
+              </a:ext>
+            </a:extLst>
+          </p:cNvPr>
           <p:cNvCxnSpPr/>
           <p:nvPr/>
         </p:nvCxnSpPr>
         <p:spPr>
           <a:xfrm flipH="1" flipV="1">
-            <a:off x="4163305" y="2859120"/>
+            <a:off x="4219672" y="2859120"/>
             <a:ext cx="26910" cy="1909652"/>
           </a:xfrm>
           <a:prstGeom prst="straightConnector1">
@@ -6650,141 +7015,13 @@
       </p:cxnSp>
       <p:sp>
         <p:nvSpPr>
-          <p:cNvPr id="18" name="Rounded Rectangle 19"/>
-          <p:cNvSpPr/>
-          <p:nvPr/>
-        </p:nvSpPr>
-        <p:spPr>
-          <a:xfrm>
-            <a:off x="2747773" y="5879813"/>
-            <a:ext cx="1468649" cy="728495"/>
-          </a:xfrm>
-          <a:prstGeom prst="roundRect">
-            <a:avLst/>
-          </a:prstGeom>
-        </p:spPr>
-        <p:style>
-          <a:lnRef idx="0">
-            <a:schemeClr val="accent3"/>
-          </a:lnRef>
-          <a:fillRef idx="3">
-            <a:schemeClr val="accent3"/>
-          </a:fillRef>
-          <a:effectRef idx="3">
-            <a:schemeClr val="accent3"/>
-          </a:effectRef>
-          <a:fontRef idx="minor">
-            <a:schemeClr val="lt1"/>
-          </a:fontRef>
-        </p:style>
-        <p:txBody>
-          <a:bodyPr rtlCol="0" anchor="ctr"/>
-          <a:lstStyle/>
-          <a:p>
-            <a:pPr algn="ctr"/>
-            <a:r>
-              <a:rPr lang="en-US" sz="1600" dirty="0"/>
-              <a:t>Schedule</a:t>
-            </a:r>
-            <a:endParaRPr lang="en-AU" sz="1600" dirty="0"/>
-          </a:p>
-        </p:txBody>
-      </p:sp>
-      <p:sp>
-        <p:nvSpPr>
-          <p:cNvPr id="19" name="Rounded Rectangle 20"/>
-          <p:cNvSpPr/>
-          <p:nvPr/>
-        </p:nvSpPr>
-        <p:spPr>
-          <a:xfrm>
-            <a:off x="4436636" y="5879813"/>
-            <a:ext cx="1468649" cy="728495"/>
-          </a:xfrm>
-          <a:prstGeom prst="roundRect">
-            <a:avLst/>
-          </a:prstGeom>
-        </p:spPr>
-        <p:style>
-          <a:lnRef idx="0">
-            <a:schemeClr val="accent3"/>
-          </a:lnRef>
-          <a:fillRef idx="3">
-            <a:schemeClr val="accent3"/>
-          </a:fillRef>
-          <a:effectRef idx="3">
-            <a:schemeClr val="accent3"/>
-          </a:effectRef>
-          <a:fontRef idx="minor">
-            <a:schemeClr val="lt1"/>
-          </a:fontRef>
-        </p:style>
-        <p:txBody>
-          <a:bodyPr rtlCol="0" anchor="ctr"/>
-          <a:lstStyle/>
-          <a:p>
-            <a:pPr algn="ctr"/>
-            <a:r>
-              <a:rPr lang="en-US" sz="1600" dirty="0"/>
-              <a:t>Referral Request</a:t>
-            </a:r>
-            <a:endParaRPr lang="en-AU" sz="1600" dirty="0"/>
-          </a:p>
-        </p:txBody>
-      </p:sp>
-      <p:sp>
-        <p:nvSpPr>
-          <p:cNvPr id="20" name="Rounded Rectangle 21"/>
-          <p:cNvSpPr/>
-          <p:nvPr/>
-        </p:nvSpPr>
-        <p:spPr>
-          <a:xfrm>
-            <a:off x="6125499" y="5879813"/>
-            <a:ext cx="1468649" cy="728495"/>
-          </a:xfrm>
-          <a:prstGeom prst="roundRect">
-            <a:avLst/>
-          </a:prstGeom>
-          <a:solidFill>
-            <a:schemeClr val="accent3">
-              <a:alpha val="50000"/>
-            </a:schemeClr>
-          </a:solidFill>
-          <a:ln>
-            <a:noFill/>
-          </a:ln>
-        </p:spPr>
-        <p:style>
-          <a:lnRef idx="0">
-            <a:scrgbClr r="0" g="0" b="0"/>
-          </a:lnRef>
-          <a:fillRef idx="0">
-            <a:scrgbClr r="0" g="0" b="0"/>
-          </a:fillRef>
-          <a:effectRef idx="0">
-            <a:scrgbClr r="0" g="0" b="0"/>
-          </a:effectRef>
-          <a:fontRef idx="minor">
-            <a:schemeClr val="lt1"/>
-          </a:fontRef>
-        </p:style>
-        <p:txBody>
-          <a:bodyPr rtlCol="0" anchor="ctr"/>
-          <a:lstStyle/>
-          <a:p>
-            <a:pPr algn="ctr"/>
-            <a:r>
-              <a:rPr lang="en-US" sz="1600" dirty="0"/>
-              <a:t>Care Plan</a:t>
-            </a:r>
-            <a:endParaRPr lang="en-AU" sz="1600" dirty="0"/>
-          </a:p>
-        </p:txBody>
-      </p:sp>
-      <p:sp>
-        <p:nvSpPr>
-          <p:cNvPr id="21" name="Rounded Rectangle 22"/>
+          <p:cNvPr id="38" name="Rounded Rectangle 22">
+            <a:extLst>
+              <a:ext uri="{FF2B5EF4-FFF2-40B4-BE49-F238E27FC236}">
+                <a16:creationId xmlns:a16="http://schemas.microsoft.com/office/drawing/2014/main" id="{C22E7E9B-82B5-EEFC-816B-7519C2F272CF}"/>
+              </a:ext>
+            </a:extLst>
+          </p:cNvPr>
           <p:cNvSpPr/>
           <p:nvPr/>
         </p:nvSpPr>
@@ -6849,148 +7086,13 @@
       </p:sp>
       <p:sp>
         <p:nvSpPr>
-          <p:cNvPr id="22" name="Rounded Rectangle 23"/>
-          <p:cNvSpPr/>
-          <p:nvPr/>
-        </p:nvSpPr>
-        <p:spPr>
-          <a:xfrm>
-            <a:off x="7814362" y="5879813"/>
-            <a:ext cx="1468649" cy="728495"/>
-          </a:xfrm>
-          <a:prstGeom prst="roundRect">
-            <a:avLst/>
-          </a:prstGeom>
-          <a:solidFill>
-            <a:schemeClr val="accent3">
-              <a:alpha val="50000"/>
-            </a:schemeClr>
-          </a:solidFill>
-          <a:ln>
-            <a:noFill/>
-          </a:ln>
-        </p:spPr>
-        <p:style>
-          <a:lnRef idx="0">
-            <a:scrgbClr r="0" g="0" b="0"/>
-          </a:lnRef>
-          <a:fillRef idx="0">
-            <a:scrgbClr r="0" g="0" b="0"/>
-          </a:fillRef>
-          <a:effectRef idx="0">
-            <a:scrgbClr r="0" g="0" b="0"/>
-          </a:effectRef>
-          <a:fontRef idx="minor">
-            <a:schemeClr val="lt1"/>
-          </a:fontRef>
-        </p:style>
-        <p:txBody>
-          <a:bodyPr lIns="36000" rIns="36000" rtlCol="0" anchor="ctr"/>
-          <a:lstStyle/>
-          <a:p>
-            <a:pPr algn="ctr"/>
-            <a:r>
-              <a:rPr lang="en-US" sz="1600" dirty="0"/>
-              <a:t>Questionnaire</a:t>
-            </a:r>
-            <a:endParaRPr lang="en-AU" sz="1600" dirty="0"/>
-          </a:p>
-        </p:txBody>
-      </p:sp>
-      <p:sp>
-        <p:nvSpPr>
-          <p:cNvPr id="23" name="Rounded Rectangle 24"/>
-          <p:cNvSpPr/>
-          <p:nvPr/>
-        </p:nvSpPr>
-        <p:spPr>
-          <a:xfrm>
-            <a:off x="9503227" y="5879813"/>
-            <a:ext cx="1468649" cy="728495"/>
-          </a:xfrm>
-          <a:prstGeom prst="roundRect">
-            <a:avLst/>
-          </a:prstGeom>
-          <a:solidFill>
-            <a:schemeClr val="accent3">
-              <a:alpha val="50000"/>
-            </a:schemeClr>
-          </a:solidFill>
-          <a:ln>
-            <a:noFill/>
-          </a:ln>
-        </p:spPr>
-        <p:style>
-          <a:lnRef idx="0">
-            <a:scrgbClr r="0" g="0" b="0"/>
-          </a:lnRef>
-          <a:fillRef idx="0">
-            <a:scrgbClr r="0" g="0" b="0"/>
-          </a:fillRef>
-          <a:effectRef idx="0">
-            <a:scrgbClr r="0" g="0" b="0"/>
-          </a:effectRef>
-          <a:fontRef idx="minor">
-            <a:schemeClr val="lt1"/>
-          </a:fontRef>
-        </p:style>
-        <p:txBody>
-          <a:bodyPr rtlCol="0" anchor="ctr"/>
-          <a:lstStyle/>
-          <a:p>
-            <a:r>
-              <a:rPr lang="en-US" sz="1600" dirty="0"/>
-              <a:t>…</a:t>
-            </a:r>
-            <a:endParaRPr lang="en-AU" sz="1600" dirty="0"/>
-          </a:p>
-        </p:txBody>
-      </p:sp>
-      <p:sp>
-        <p:nvSpPr>
-          <p:cNvPr id="24" name="Rounded Rectangle 26"/>
-          <p:cNvSpPr/>
-          <p:nvPr/>
-        </p:nvSpPr>
-        <p:spPr>
-          <a:xfrm>
-            <a:off x="1058910" y="5879813"/>
-            <a:ext cx="1468649" cy="728495"/>
-          </a:xfrm>
-          <a:prstGeom prst="roundRect">
-            <a:avLst/>
-          </a:prstGeom>
-        </p:spPr>
-        <p:style>
-          <a:lnRef idx="0">
-            <a:schemeClr val="accent3"/>
-          </a:lnRef>
-          <a:fillRef idx="3">
-            <a:schemeClr val="accent3"/>
-          </a:fillRef>
-          <a:effectRef idx="3">
-            <a:schemeClr val="accent3"/>
-          </a:effectRef>
-          <a:fontRef idx="minor">
-            <a:schemeClr val="lt1"/>
-          </a:fontRef>
-        </p:style>
-        <p:txBody>
-          <a:bodyPr rtlCol="0" anchor="ctr"/>
-          <a:lstStyle/>
-          <a:p>
-            <a:pPr algn="ctr"/>
-            <a:r>
-              <a:rPr lang="en-US" sz="1600" dirty="0"/>
-              <a:t>Document Reference</a:t>
-            </a:r>
-            <a:endParaRPr lang="en-AU" sz="1600" dirty="0"/>
-          </a:p>
-        </p:txBody>
-      </p:sp>
-      <p:sp>
-        <p:nvSpPr>
-          <p:cNvPr id="4" name="Rounded Rectangle 5"/>
+          <p:cNvPr id="39" name="Rounded Rectangle 5">
+            <a:extLst>
+              <a:ext uri="{FF2B5EF4-FFF2-40B4-BE49-F238E27FC236}">
+                <a16:creationId xmlns:a16="http://schemas.microsoft.com/office/drawing/2014/main" id="{FF25229F-17DA-3A30-BAC4-03056965FEED}"/>
+              </a:ext>
+            </a:extLst>
+          </p:cNvPr>
           <p:cNvSpPr/>
           <p:nvPr/>
         </p:nvSpPr>
@@ -7055,14 +7157,20 @@
       </p:sp>
       <p:sp>
         <p:nvSpPr>
-          <p:cNvPr id="5" name="Rounded Rectangle 6"/>
+          <p:cNvPr id="40" name="Rounded Rectangle 6">
+            <a:extLst>
+              <a:ext uri="{FF2B5EF4-FFF2-40B4-BE49-F238E27FC236}">
+                <a16:creationId xmlns:a16="http://schemas.microsoft.com/office/drawing/2014/main" id="{88CEF192-CB2A-AAA2-0674-469CC769E802}"/>
+              </a:ext>
+            </a:extLst>
+          </p:cNvPr>
           <p:cNvSpPr/>
           <p:nvPr/>
         </p:nvSpPr>
         <p:spPr>
           <a:xfrm>
-            <a:off x="2071253" y="3233853"/>
-            <a:ext cx="1468649" cy="728495"/>
+            <a:off x="1370717" y="3204474"/>
+            <a:ext cx="1465819" cy="728495"/>
           </a:xfrm>
           <a:prstGeom prst="roundRect">
             <a:avLst/>
@@ -7120,7 +7228,13 @@
       </p:sp>
       <p:sp>
         <p:nvSpPr>
-          <p:cNvPr id="6" name="Rounded Rectangle 7"/>
+          <p:cNvPr id="41" name="Rounded Rectangle 7">
+            <a:extLst>
+              <a:ext uri="{FF2B5EF4-FFF2-40B4-BE49-F238E27FC236}">
+                <a16:creationId xmlns:a16="http://schemas.microsoft.com/office/drawing/2014/main" id="{2FE4501A-B52D-EDA0-CA83-0586153153C7}"/>
+              </a:ext>
+            </a:extLst>
+          </p:cNvPr>
           <p:cNvSpPr/>
           <p:nvPr/>
         </p:nvSpPr>
@@ -7176,25 +7290,23 @@
               <a:t>Practitioner</a:t>
             </a:r>
           </a:p>
-          <a:p>
-            <a:pPr algn="ctr"/>
-            <a:endParaRPr lang="en-AU" dirty="0">
-              <a:solidFill>
-                <a:schemeClr val="tx1"/>
-              </a:solidFill>
-            </a:endParaRPr>
-          </a:p>
-        </p:txBody>
-      </p:sp>
-      <p:sp>
-        <p:nvSpPr>
-          <p:cNvPr id="7" name="Rounded Rectangle 8"/>
+        </p:txBody>
+      </p:sp>
+      <p:sp>
+        <p:nvSpPr>
+          <p:cNvPr id="42" name="Rounded Rectangle 8">
+            <a:extLst>
+              <a:ext uri="{FF2B5EF4-FFF2-40B4-BE49-F238E27FC236}">
+                <a16:creationId xmlns:a16="http://schemas.microsoft.com/office/drawing/2014/main" id="{CC479594-C5A8-65EA-0DD0-6AE8EAB8EF1B}"/>
+              </a:ext>
+            </a:extLst>
+          </p:cNvPr>
           <p:cNvSpPr/>
           <p:nvPr/>
         </p:nvSpPr>
         <p:spPr>
           <a:xfrm>
-            <a:off x="3766162" y="4609867"/>
+            <a:off x="3875271" y="4595372"/>
             <a:ext cx="1468649" cy="728495"/>
           </a:xfrm>
           <a:prstGeom prst="roundRect">
@@ -7253,7 +7365,13 @@
       </p:sp>
       <p:cxnSp>
         <p:nvCxnSpPr>
-          <p:cNvPr id="71" name="Elbow Connector 37"/>
+          <p:cNvPr id="43" name="Elbow Connector 37">
+            <a:extLst>
+              <a:ext uri="{FF2B5EF4-FFF2-40B4-BE49-F238E27FC236}">
+                <a16:creationId xmlns:a16="http://schemas.microsoft.com/office/drawing/2014/main" id="{64EADB20-A9D1-76C0-BEFB-E712C204CCF6}"/>
+              </a:ext>
+            </a:extLst>
+          </p:cNvPr>
           <p:cNvCxnSpPr/>
           <p:nvPr/>
         </p:nvCxnSpPr>
@@ -7292,7 +7410,13 @@
       </p:cxnSp>
       <p:sp>
         <p:nvSpPr>
-          <p:cNvPr id="8" name="Rounded Rectangle 9"/>
+          <p:cNvPr id="44" name="Rounded Rectangle 9">
+            <a:extLst>
+              <a:ext uri="{FF2B5EF4-FFF2-40B4-BE49-F238E27FC236}">
+                <a16:creationId xmlns:a16="http://schemas.microsoft.com/office/drawing/2014/main" id="{339BED41-2E19-7B83-CE6F-EC35B4CEA1CF}"/>
+              </a:ext>
+            </a:extLst>
+          </p:cNvPr>
           <p:cNvSpPr/>
           <p:nvPr/>
         </p:nvSpPr>
@@ -7355,47 +7479,25 @@
           </a:p>
         </p:txBody>
       </p:sp>
-      <p:sp>
-        <p:nvSpPr>
-          <p:cNvPr id="2" name="Title 1"/>
-          <p:cNvSpPr>
-            <a:spLocks noGrp="1"/>
-          </p:cNvSpPr>
-          <p:nvPr>
-            <p:ph type="title"/>
-          </p:nvPr>
-        </p:nvSpPr>
-        <p:spPr/>
-        <p:txBody>
-          <a:bodyPr/>
-          <a:lstStyle/>
-          <a:p>
-            <a:r>
-              <a:rPr lang="en-AU" dirty="0"/>
-              <a:t>Directories</a:t>
-            </a:r>
-          </a:p>
-        </p:txBody>
-      </p:sp>
       <p:cxnSp>
         <p:nvCxnSpPr>
-          <p:cNvPr id="26" name="Connector: Curved 25">
+          <p:cNvPr id="45" name="Connector: Curved 44">
             <a:extLst>
               <a:ext uri="{FF2B5EF4-FFF2-40B4-BE49-F238E27FC236}">
-                <a16:creationId xmlns:a16="http://schemas.microsoft.com/office/drawing/2014/main" id="{FEB1B621-35B1-6D4A-4491-C8CA35F1AF3C}"/>
+                <a16:creationId xmlns:a16="http://schemas.microsoft.com/office/drawing/2014/main" id="{92DDEF49-E924-B7E0-BB86-22F5A10D02C9}"/>
               </a:ext>
             </a:extLst>
           </p:cNvPr>
           <p:cNvCxnSpPr>
             <a:cxnSpLocks/>
-            <a:stCxn id="7" idx="2"/>
-            <a:endCxn id="7" idx="1"/>
+            <a:stCxn id="42" idx="2"/>
+            <a:endCxn id="42" idx="1"/>
           </p:cNvCxnSpPr>
           <p:nvPr/>
         </p:nvCxnSpPr>
         <p:spPr>
           <a:xfrm rot="5400000" flipH="1">
-            <a:off x="3951201" y="4789077"/>
+            <a:off x="4060310" y="4774582"/>
             <a:ext cx="364247" cy="734325"/>
           </a:xfrm>
           <a:prstGeom prst="curvedConnector4">
@@ -7425,10 +7527,10 @@
       </p:cxnSp>
       <p:sp>
         <p:nvSpPr>
-          <p:cNvPr id="27" name="TextBox 26">
+          <p:cNvPr id="46" name="TextBox 45">
             <a:extLst>
               <a:ext uri="{FF2B5EF4-FFF2-40B4-BE49-F238E27FC236}">
-                <a16:creationId xmlns:a16="http://schemas.microsoft.com/office/drawing/2014/main" id="{6C57655D-6292-A296-0740-B12D54025239}"/>
+                <a16:creationId xmlns:a16="http://schemas.microsoft.com/office/drawing/2014/main" id="{53A64531-4C12-150A-5877-7F110E73D2CB}"/>
               </a:ext>
             </a:extLst>
           </p:cNvPr>
@@ -7437,7 +7539,7 @@
         </p:nvSpPr>
         <p:spPr>
           <a:xfrm>
-            <a:off x="2614285" y="5084330"/>
+            <a:off x="2907063" y="5370281"/>
             <a:ext cx="952312" cy="338554"/>
           </a:xfrm>
           <a:prstGeom prst="rect">
@@ -7459,6 +7561,357 @@
           </a:p>
         </p:txBody>
       </p:sp>
+      <p:sp>
+        <p:nvSpPr>
+          <p:cNvPr id="47" name="Rounded Rectangle 9">
+            <a:extLst>
+              <a:ext uri="{FF2B5EF4-FFF2-40B4-BE49-F238E27FC236}">
+                <a16:creationId xmlns:a16="http://schemas.microsoft.com/office/drawing/2014/main" id="{169FFDB8-7DB7-5867-B635-F8EDF7C09F00}"/>
+              </a:ext>
+            </a:extLst>
+          </p:cNvPr>
+          <p:cNvSpPr/>
+          <p:nvPr/>
+        </p:nvSpPr>
+        <p:spPr>
+          <a:xfrm>
+            <a:off x="1838579" y="2050388"/>
+            <a:ext cx="1468649" cy="728495"/>
+          </a:xfrm>
+          <a:prstGeom prst="roundRect">
+            <a:avLst/>
+          </a:prstGeom>
+          <a:solidFill>
+            <a:srgbClr val="CEE1F2"/>
+          </a:solidFill>
+          <a:ln cap="rnd">
+            <a:round/>
+          </a:ln>
+          <a:effectLst>
+            <a:outerShdw blurRad="50800" dist="38100" dir="2700000" algn="tl" rotWithShape="0">
+              <a:prstClr val="black">
+                <a:alpha val="40000"/>
+              </a:prstClr>
+            </a:outerShdw>
+          </a:effectLst>
+        </p:spPr>
+        <p:style>
+          <a:lnRef idx="2">
+            <a:schemeClr val="accent1">
+              <a:shade val="50000"/>
+            </a:schemeClr>
+          </a:lnRef>
+          <a:fillRef idx="1">
+            <a:schemeClr val="accent1"/>
+          </a:fillRef>
+          <a:effectRef idx="0">
+            <a:schemeClr val="accent1"/>
+          </a:effectRef>
+          <a:fontRef idx="minor">
+            <a:schemeClr val="lt1"/>
+          </a:fontRef>
+        </p:style>
+        <p:txBody>
+          <a:bodyPr rtlCol="0" anchor="ctr"/>
+          <a:lstStyle/>
+          <a:p>
+            <a:pPr algn="ctr"/>
+            <a:r>
+              <a:rPr lang="en-US" dirty="0">
+                <a:solidFill>
+                  <a:schemeClr val="tx1"/>
+                </a:solidFill>
+              </a:rPr>
+              <a:t>Insurance Plan</a:t>
+            </a:r>
+            <a:endParaRPr lang="en-AU" dirty="0">
+              <a:solidFill>
+                <a:schemeClr val="tx1"/>
+              </a:solidFill>
+            </a:endParaRPr>
+          </a:p>
+        </p:txBody>
+      </p:sp>
+      <p:cxnSp>
+        <p:nvCxnSpPr>
+          <p:cNvPr id="48" name="Elbow Connector 37">
+            <a:extLst>
+              <a:ext uri="{FF2B5EF4-FFF2-40B4-BE49-F238E27FC236}">
+                <a16:creationId xmlns:a16="http://schemas.microsoft.com/office/drawing/2014/main" id="{A51B99A8-A231-9D7D-C6D7-B3ED75E03C45}"/>
+              </a:ext>
+            </a:extLst>
+          </p:cNvPr>
+          <p:cNvCxnSpPr>
+            <a:cxnSpLocks/>
+            <a:stCxn id="47" idx="3"/>
+          </p:cNvCxnSpPr>
+          <p:nvPr/>
+        </p:nvCxnSpPr>
+        <p:spPr>
+          <a:xfrm flipV="1">
+            <a:off x="3307228" y="2370192"/>
+            <a:ext cx="344002" cy="44444"/>
+          </a:xfrm>
+          <a:prstGeom prst="straightConnector1">
+            <a:avLst/>
+          </a:prstGeom>
+          <a:ln>
+            <a:tailEnd type="triangle"/>
+          </a:ln>
+        </p:spPr>
+        <p:style>
+          <a:lnRef idx="3">
+            <a:schemeClr val="dk1"/>
+          </a:lnRef>
+          <a:fillRef idx="0">
+            <a:schemeClr val="dk1"/>
+          </a:fillRef>
+          <a:effectRef idx="2">
+            <a:schemeClr val="dk1"/>
+          </a:effectRef>
+          <a:fontRef idx="minor">
+            <a:schemeClr val="tx1"/>
+          </a:fontRef>
+        </p:style>
+      </p:cxnSp>
+      <p:cxnSp>
+        <p:nvCxnSpPr>
+          <p:cNvPr id="49" name="Elbow Connector 37">
+            <a:extLst>
+              <a:ext uri="{FF2B5EF4-FFF2-40B4-BE49-F238E27FC236}">
+                <a16:creationId xmlns:a16="http://schemas.microsoft.com/office/drawing/2014/main" id="{F3AB6800-DA52-5D1A-E68C-F2201D634548}"/>
+              </a:ext>
+            </a:extLst>
+          </p:cNvPr>
+          <p:cNvCxnSpPr>
+            <a:cxnSpLocks/>
+            <a:stCxn id="47" idx="2"/>
+          </p:cNvCxnSpPr>
+          <p:nvPr/>
+        </p:nvCxnSpPr>
+        <p:spPr>
+          <a:xfrm flipH="1">
+            <a:off x="2465891" y="2778883"/>
+            <a:ext cx="107013" cy="359700"/>
+          </a:xfrm>
+          <a:prstGeom prst="straightConnector1">
+            <a:avLst/>
+          </a:prstGeom>
+          <a:ln>
+            <a:tailEnd type="triangle"/>
+          </a:ln>
+        </p:spPr>
+        <p:style>
+          <a:lnRef idx="3">
+            <a:schemeClr val="dk1"/>
+          </a:lnRef>
+          <a:fillRef idx="0">
+            <a:schemeClr val="dk1"/>
+          </a:fillRef>
+          <a:effectRef idx="2">
+            <a:schemeClr val="dk1"/>
+          </a:effectRef>
+          <a:fontRef idx="minor">
+            <a:schemeClr val="tx1"/>
+          </a:fontRef>
+        </p:style>
+      </p:cxnSp>
+      <p:cxnSp>
+        <p:nvCxnSpPr>
+          <p:cNvPr id="50" name="Elbow Connector 37">
+            <a:extLst>
+              <a:ext uri="{FF2B5EF4-FFF2-40B4-BE49-F238E27FC236}">
+                <a16:creationId xmlns:a16="http://schemas.microsoft.com/office/drawing/2014/main" id="{39792D4A-F3E5-E73D-387B-6FC470A35AB8}"/>
+              </a:ext>
+            </a:extLst>
+          </p:cNvPr>
+          <p:cNvCxnSpPr>
+            <a:cxnSpLocks/>
+          </p:cNvCxnSpPr>
+          <p:nvPr/>
+        </p:nvCxnSpPr>
+        <p:spPr>
+          <a:xfrm flipV="1">
+            <a:off x="3090441" y="2884025"/>
+            <a:ext cx="824088" cy="1599464"/>
+          </a:xfrm>
+          <a:prstGeom prst="straightConnector1">
+            <a:avLst/>
+          </a:prstGeom>
+          <a:ln>
+            <a:tailEnd type="triangle"/>
+          </a:ln>
+        </p:spPr>
+        <p:style>
+          <a:lnRef idx="3">
+            <a:schemeClr val="dk1"/>
+          </a:lnRef>
+          <a:fillRef idx="0">
+            <a:schemeClr val="dk1"/>
+          </a:fillRef>
+          <a:effectRef idx="2">
+            <a:schemeClr val="dk1"/>
+          </a:effectRef>
+          <a:fontRef idx="minor">
+            <a:schemeClr val="tx1"/>
+          </a:fontRef>
+        </p:style>
+      </p:cxnSp>
+      <p:sp>
+        <p:nvSpPr>
+          <p:cNvPr id="51" name="Rounded Rectangle 5">
+            <a:extLst>
+              <a:ext uri="{FF2B5EF4-FFF2-40B4-BE49-F238E27FC236}">
+                <a16:creationId xmlns:a16="http://schemas.microsoft.com/office/drawing/2014/main" id="{F78B3BF0-B346-8CD2-9BBF-325AA8A934C7}"/>
+              </a:ext>
+            </a:extLst>
+          </p:cNvPr>
+          <p:cNvSpPr/>
+          <p:nvPr/>
+        </p:nvSpPr>
+        <p:spPr>
+          <a:xfrm>
+            <a:off x="1710208" y="4412894"/>
+            <a:ext cx="1468649" cy="728495"/>
+          </a:xfrm>
+          <a:prstGeom prst="roundRect">
+            <a:avLst/>
+          </a:prstGeom>
+          <a:solidFill>
+            <a:srgbClr val="CEE1F2"/>
+          </a:solidFill>
+          <a:ln cap="rnd">
+            <a:round/>
+          </a:ln>
+          <a:effectLst>
+            <a:outerShdw blurRad="50800" dist="38100" dir="2700000" algn="tl" rotWithShape="0">
+              <a:prstClr val="black">
+                <a:alpha val="40000"/>
+              </a:prstClr>
+            </a:outerShdw>
+          </a:effectLst>
+        </p:spPr>
+        <p:style>
+          <a:lnRef idx="2">
+            <a:schemeClr val="accent1">
+              <a:shade val="50000"/>
+            </a:schemeClr>
+          </a:lnRef>
+          <a:fillRef idx="1">
+            <a:schemeClr val="accent1"/>
+          </a:fillRef>
+          <a:effectRef idx="0">
+            <a:schemeClr val="accent1"/>
+          </a:effectRef>
+          <a:fontRef idx="minor">
+            <a:schemeClr val="lt1"/>
+          </a:fontRef>
+        </p:style>
+        <p:txBody>
+          <a:bodyPr rtlCol="0" anchor="ctr"/>
+          <a:lstStyle/>
+          <a:p>
+            <a:pPr algn="ctr"/>
+            <a:r>
+              <a:rPr lang="en-US" dirty="0">
+                <a:solidFill>
+                  <a:schemeClr val="tx1"/>
+                </a:solidFill>
+              </a:rPr>
+              <a:t>Organization Affiliation</a:t>
+            </a:r>
+            <a:endParaRPr lang="en-AU" dirty="0">
+              <a:solidFill>
+                <a:schemeClr val="tx1"/>
+              </a:solidFill>
+            </a:endParaRPr>
+          </a:p>
+        </p:txBody>
+      </p:sp>
+      <p:cxnSp>
+        <p:nvCxnSpPr>
+          <p:cNvPr id="52" name="Elbow Connector 37">
+            <a:extLst>
+              <a:ext uri="{FF2B5EF4-FFF2-40B4-BE49-F238E27FC236}">
+                <a16:creationId xmlns:a16="http://schemas.microsoft.com/office/drawing/2014/main" id="{2B6D7D15-0687-5799-19A1-0A08BC418271}"/>
+              </a:ext>
+            </a:extLst>
+          </p:cNvPr>
+          <p:cNvCxnSpPr>
+            <a:cxnSpLocks/>
+            <a:stCxn id="51" idx="0"/>
+          </p:cNvCxnSpPr>
+          <p:nvPr/>
+        </p:nvCxnSpPr>
+        <p:spPr>
+          <a:xfrm flipH="1" flipV="1">
+            <a:off x="2413446" y="4073273"/>
+            <a:ext cx="31087" cy="339621"/>
+          </a:xfrm>
+          <a:prstGeom prst="straightConnector1">
+            <a:avLst/>
+          </a:prstGeom>
+          <a:ln>
+            <a:tailEnd type="triangle"/>
+          </a:ln>
+        </p:spPr>
+        <p:style>
+          <a:lnRef idx="3">
+            <a:schemeClr val="dk1"/>
+          </a:lnRef>
+          <a:fillRef idx="0">
+            <a:schemeClr val="dk1"/>
+          </a:fillRef>
+          <a:effectRef idx="2">
+            <a:schemeClr val="dk1"/>
+          </a:effectRef>
+          <a:fontRef idx="minor">
+            <a:schemeClr val="tx1"/>
+          </a:fontRef>
+        </p:style>
+      </p:cxnSp>
+      <p:cxnSp>
+        <p:nvCxnSpPr>
+          <p:cNvPr id="53" name="Elbow Connector 37">
+            <a:extLst>
+              <a:ext uri="{FF2B5EF4-FFF2-40B4-BE49-F238E27FC236}">
+                <a16:creationId xmlns:a16="http://schemas.microsoft.com/office/drawing/2014/main" id="{28F05287-5990-696D-C4BA-34210A26869F}"/>
+              </a:ext>
+            </a:extLst>
+          </p:cNvPr>
+          <p:cNvCxnSpPr>
+            <a:cxnSpLocks/>
+            <a:stCxn id="51" idx="3"/>
+          </p:cNvCxnSpPr>
+          <p:nvPr/>
+        </p:nvCxnSpPr>
+        <p:spPr>
+          <a:xfrm>
+            <a:off x="3178857" y="4777142"/>
+            <a:ext cx="473718" cy="109311"/>
+          </a:xfrm>
+          <a:prstGeom prst="straightConnector1">
+            <a:avLst/>
+          </a:prstGeom>
+          <a:ln>
+            <a:tailEnd type="triangle"/>
+          </a:ln>
+        </p:spPr>
+        <p:style>
+          <a:lnRef idx="3">
+            <a:schemeClr val="dk1"/>
+          </a:lnRef>
+          <a:fillRef idx="0">
+            <a:schemeClr val="dk1"/>
+          </a:fillRef>
+          <a:effectRef idx="2">
+            <a:schemeClr val="dk1"/>
+          </a:effectRef>
+          <a:fontRef idx="minor">
+            <a:schemeClr val="tx1"/>
+          </a:fontRef>
+        </p:style>
+      </p:cxnSp>
     </p:spTree>
     <p:extLst>
       <p:ext uri="{BB962C8B-B14F-4D97-AF65-F5344CB8AC3E}">
@@ -12153,7 +12606,7 @@
         </p:nvSpPr>
         <p:spPr>
           <a:xfrm>
-            <a:off x="1948687" y="1470681"/>
+            <a:off x="5285919" y="2398465"/>
             <a:ext cx="1468649" cy="728495"/>
           </a:xfrm>
           <a:prstGeom prst="roundRect">
@@ -12200,7 +12653,7 @@
                   <a:schemeClr val="tx1"/>
                 </a:solidFill>
               </a:rPr>
-              <a:t>Organization</a:t>
+              <a:t>…</a:t>
             </a:r>
             <a:endParaRPr lang="en-AU" dirty="0">
               <a:solidFill>
@@ -12218,7 +12671,7 @@
         </p:nvSpPr>
         <p:spPr>
           <a:xfrm>
-            <a:off x="1964883" y="2382967"/>
+            <a:off x="1964883" y="2398465"/>
             <a:ext cx="1468649" cy="728495"/>
           </a:xfrm>
           <a:prstGeom prst="roundRect">
@@ -12283,7 +12736,7 @@
         </p:nvSpPr>
         <p:spPr>
           <a:xfrm>
-            <a:off x="3617383" y="1497641"/>
+            <a:off x="1964882" y="1513411"/>
             <a:ext cx="1468649" cy="728495"/>
           </a:xfrm>
           <a:prstGeom prst="roundRect">
@@ -12343,7 +12796,7 @@
         </p:nvSpPr>
         <p:spPr>
           <a:xfrm>
-            <a:off x="5285920" y="1507553"/>
+            <a:off x="5285920" y="1513411"/>
             <a:ext cx="1468649" cy="728495"/>
           </a:xfrm>
           <a:prstGeom prst="roundRect">
@@ -12809,7 +13262,7 @@
         </p:nvSpPr>
         <p:spPr>
           <a:xfrm>
-            <a:off x="5286394" y="2382966"/>
+            <a:off x="3604461" y="2398465"/>
             <a:ext cx="1468175" cy="728495"/>
           </a:xfrm>
           <a:prstGeom prst="roundRect">
@@ -13070,7 +13523,7 @@
         <p:spPr>
           <a:xfrm>
             <a:off x="1094623" y="3678973"/>
-            <a:ext cx="1225528" cy="338554"/>
+            <a:ext cx="1225528" cy="584775"/>
           </a:xfrm>
           <a:prstGeom prst="rect">
             <a:avLst/>
@@ -13086,6 +13539,13 @@
             <a:r>
               <a:rPr lang="en-US" sz="1600" dirty="0"/>
               <a:t>Schedule for</a:t>
+            </a:r>
+          </a:p>
+          <a:p>
+            <a:pPr algn="ctr"/>
+            <a:r>
+              <a:rPr lang="en-US" sz="1600" dirty="0"/>
+              <a:t>(actor)</a:t>
             </a:r>
           </a:p>
         </p:txBody>
@@ -13254,7 +13714,7 @@
         </p:nvSpPr>
         <p:spPr>
           <a:xfrm>
-            <a:off x="3629235" y="2395490"/>
+            <a:off x="3603987" y="1513411"/>
             <a:ext cx="1468649" cy="728495"/>
           </a:xfrm>
           <a:prstGeom prst="roundRect">
@@ -13335,13 +13795,13 @@
         </p:nvCxnSpPr>
         <p:spPr>
           <a:xfrm flipH="1" flipV="1">
-            <a:off x="6020245" y="1507553"/>
+            <a:off x="6020245" y="1513411"/>
             <a:ext cx="734324" cy="364248"/>
           </a:xfrm>
           <a:prstGeom prst="curvedConnector4">
             <a:avLst>
-              <a:gd name="adj1" fmla="val -23458"/>
-              <a:gd name="adj2" fmla="val 146102"/>
+              <a:gd name="adj1" fmla="val -31131"/>
+              <a:gd name="adj2" fmla="val 162759"/>
             </a:avLst>
           </a:prstGeom>
           <a:ln>
@@ -13377,7 +13837,7 @@
         </p:nvSpPr>
         <p:spPr>
           <a:xfrm>
-            <a:off x="6925025" y="1396804"/>
+            <a:off x="6940523" y="1396804"/>
             <a:ext cx="952312" cy="338554"/>
           </a:xfrm>
           <a:prstGeom prst="rect">

</xml_diff>